<commit_message>
added schemas in the ppt
</commit_message>
<xml_diff>
--- a/Projet final.pptx
+++ b/Projet final.pptx
@@ -6,9 +6,16 @@
   </p:sldMasterIdLst>
   <p:sldIdLst>
     <p:sldId id="256" r:id="rId2"/>
-    <p:sldId id="257" r:id="rId3"/>
-    <p:sldId id="258" r:id="rId4"/>
-    <p:sldId id="259" r:id="rId5"/>
+    <p:sldId id="260" r:id="rId3"/>
+    <p:sldId id="257" r:id="rId4"/>
+    <p:sldId id="258" r:id="rId5"/>
+    <p:sldId id="259" r:id="rId6"/>
+    <p:sldId id="261" r:id="rId7"/>
+    <p:sldId id="262" r:id="rId8"/>
+    <p:sldId id="264" r:id="rId9"/>
+    <p:sldId id="265" r:id="rId10"/>
+    <p:sldId id="266" r:id="rId11"/>
+    <p:sldId id="263" r:id="rId12"/>
   </p:sldIdLst>
   <p:sldSz cx="12192000" cy="6858000"/>
   <p:notesSz cx="6858000" cy="9144000"/>
@@ -2983,10 +2990,10 @@
           <a:lstStyle/>
           <a:p>
             <a:r>
-              <a:rPr lang="fr-FR" dirty="0" smtClean="0"/>
+              <a:rPr lang="fr-FR" b="1" dirty="0" smtClean="0"/>
               <a:t>Projet final</a:t>
             </a:r>
-            <a:endParaRPr lang="fr-FR" dirty="0"/>
+            <a:endParaRPr lang="fr-FR" b="1" dirty="0"/>
           </a:p>
         </p:txBody>
       </p:sp>
@@ -3073,7 +3080,7 @@
         </p:blipFill>
         <p:spPr bwMode="auto">
           <a:xfrm>
-            <a:off x="133004" y="5078835"/>
+            <a:off x="10471323" y="133282"/>
             <a:ext cx="1288472" cy="1779165"/>
           </a:xfrm>
           <a:prstGeom prst="rect">
@@ -3155,7 +3162,7 @@
         </p:blipFill>
         <p:spPr bwMode="auto">
           <a:xfrm>
-            <a:off x="8731538" y="242888"/>
+            <a:off x="166036" y="5108048"/>
             <a:ext cx="3327458" cy="1721960"/>
           </a:xfrm>
           <a:prstGeom prst="rect">
@@ -3186,6 +3193,163 @@
 </p:sld>
 </file>
 
+<file path=ppt/slides/slide10.xml><?xml version="1.0" encoding="utf-8"?>
+<p:sld xmlns:a="http://schemas.openxmlformats.org/drawingml/2006/main" xmlns:r="http://schemas.openxmlformats.org/officeDocument/2006/relationships" xmlns:p="http://schemas.openxmlformats.org/presentationml/2006/main">
+  <p:cSld>
+    <p:spTree>
+      <p:nvGrpSpPr>
+        <p:cNvPr id="1" name=""/>
+        <p:cNvGrpSpPr/>
+        <p:nvPr/>
+      </p:nvGrpSpPr>
+      <p:grpSpPr>
+        <a:xfrm>
+          <a:off x="0" y="0"/>
+          <a:ext cx="0" cy="0"/>
+          <a:chOff x="0" y="0"/>
+          <a:chExt cx="0" cy="0"/>
+        </a:xfrm>
+      </p:grpSpPr>
+      <p:sp>
+        <p:nvSpPr>
+          <p:cNvPr id="2" name="Titre 1"/>
+          <p:cNvSpPr>
+            <a:spLocks noGrp="1"/>
+          </p:cNvSpPr>
+          <p:nvPr>
+            <p:ph type="title"/>
+          </p:nvPr>
+        </p:nvSpPr>
+        <p:spPr/>
+        <p:txBody>
+          <a:bodyPr/>
+          <a:lstStyle/>
+          <a:p>
+            <a:endParaRPr lang="fr-FR"/>
+          </a:p>
+        </p:txBody>
+      </p:sp>
+      <p:sp>
+        <p:nvSpPr>
+          <p:cNvPr id="3" name="Espace réservé du contenu 2"/>
+          <p:cNvSpPr>
+            <a:spLocks noGrp="1"/>
+          </p:cNvSpPr>
+          <p:nvPr>
+            <p:ph idx="1"/>
+          </p:nvPr>
+        </p:nvSpPr>
+        <p:spPr/>
+        <p:txBody>
+          <a:bodyPr/>
+          <a:lstStyle/>
+          <a:p>
+            <a:endParaRPr lang="fr-FR"/>
+          </a:p>
+        </p:txBody>
+      </p:sp>
+    </p:spTree>
+    <p:extLst>
+      <p:ext uri="{BB962C8B-B14F-4D97-AF65-F5344CB8AC3E}">
+        <p14:creationId xmlns:p14="http://schemas.microsoft.com/office/powerpoint/2010/main" val="163689639"/>
+      </p:ext>
+    </p:extLst>
+  </p:cSld>
+  <p:clrMapOvr>
+    <a:masterClrMapping/>
+  </p:clrMapOvr>
+</p:sld>
+</file>
+
+<file path=ppt/slides/slide11.xml><?xml version="1.0" encoding="utf-8"?>
+<p:sld xmlns:a="http://schemas.openxmlformats.org/drawingml/2006/main" xmlns:r="http://schemas.openxmlformats.org/officeDocument/2006/relationships" xmlns:p="http://schemas.openxmlformats.org/presentationml/2006/main">
+  <p:cSld>
+    <p:spTree>
+      <p:nvGrpSpPr>
+        <p:cNvPr id="1" name=""/>
+        <p:cNvGrpSpPr/>
+        <p:nvPr/>
+      </p:nvGrpSpPr>
+      <p:grpSpPr>
+        <a:xfrm>
+          <a:off x="0" y="0"/>
+          <a:ext cx="0" cy="0"/>
+          <a:chOff x="0" y="0"/>
+          <a:chExt cx="0" cy="0"/>
+        </a:xfrm>
+      </p:grpSpPr>
+      <p:pic>
+        <p:nvPicPr>
+          <p:cNvPr id="3" name="Image 2"/>
+          <p:cNvPicPr>
+            <a:picLocks noChangeAspect="1"/>
+          </p:cNvPicPr>
+          <p:nvPr/>
+        </p:nvPicPr>
+        <p:blipFill rotWithShape="1">
+          <a:blip r:embed="rId2" cstate="print">
+            <a:extLst>
+              <a:ext uri="{28A0092B-C50C-407E-A947-70E740481C1C}">
+                <a14:useLocalDpi xmlns:a14="http://schemas.microsoft.com/office/drawing/2010/main" val="0"/>
+              </a:ext>
+            </a:extLst>
+          </a:blip>
+          <a:srcRect l="23736" t="36661" r="30849" b="51180"/>
+          <a:stretch/>
+        </p:blipFill>
+        <p:spPr>
+          <a:xfrm>
+            <a:off x="1764424" y="161776"/>
+            <a:ext cx="8608299" cy="5010299"/>
+          </a:xfrm>
+          <a:prstGeom prst="rect">
+            <a:avLst/>
+          </a:prstGeom>
+        </p:spPr>
+      </p:pic>
+      <p:sp>
+        <p:nvSpPr>
+          <p:cNvPr id="4" name="ZoneTexte 3"/>
+          <p:cNvSpPr txBox="1"/>
+          <p:nvPr/>
+        </p:nvSpPr>
+        <p:spPr>
+          <a:xfrm>
+            <a:off x="3051304" y="5305425"/>
+            <a:ext cx="6034537" cy="707886"/>
+          </a:xfrm>
+          <a:prstGeom prst="rect">
+            <a:avLst/>
+          </a:prstGeom>
+          <a:noFill/>
+        </p:spPr>
+        <p:txBody>
+          <a:bodyPr wrap="none" rtlCol="0">
+            <a:spAutoFit/>
+          </a:bodyPr>
+          <a:lstStyle/>
+          <a:p>
+            <a:r>
+              <a:rPr lang="fr-FR" sz="4000" b="1" dirty="0" smtClean="0"/>
+              <a:t>Merci pour votre attention!</a:t>
+            </a:r>
+            <a:endParaRPr lang="fr-FR" sz="4000" b="1" dirty="0"/>
+          </a:p>
+        </p:txBody>
+      </p:sp>
+    </p:spTree>
+    <p:extLst>
+      <p:ext uri="{BB962C8B-B14F-4D97-AF65-F5344CB8AC3E}">
+        <p14:creationId xmlns:p14="http://schemas.microsoft.com/office/powerpoint/2010/main" val="1372413317"/>
+      </p:ext>
+    </p:extLst>
+  </p:cSld>
+  <p:clrMapOvr>
+    <a:masterClrMapping/>
+  </p:clrMapOvr>
+</p:sld>
+</file>
+
 <file path=ppt/slides/slide2.xml><?xml version="1.0" encoding="utf-8"?>
 <p:sld xmlns:a="http://schemas.openxmlformats.org/drawingml/2006/main" xmlns:r="http://schemas.openxmlformats.org/officeDocument/2006/relationships" xmlns:p="http://schemas.openxmlformats.org/presentationml/2006/main">
   <p:cSld>
@@ -3220,7 +3384,7 @@
           <a:p>
             <a:r>
               <a:rPr lang="fr-FR" dirty="0" smtClean="0"/>
-              <a:t>Idée</a:t>
+              <a:t>But du projet</a:t>
             </a:r>
             <a:endParaRPr lang="fr-FR" dirty="0"/>
           </a:p>
@@ -3228,170 +3392,500 @@
       </p:sp>
       <p:sp>
         <p:nvSpPr>
-          <p:cNvPr id="3" name="Espace réservé du contenu 2"/>
-          <p:cNvSpPr>
-            <a:spLocks noGrp="1"/>
-          </p:cNvSpPr>
-          <p:nvPr>
-            <p:ph idx="1"/>
-          </p:nvPr>
+          <p:cNvPr id="4" name="Rectangle 3"/>
+          <p:cNvSpPr/>
+          <p:nvPr/>
         </p:nvSpPr>
         <p:spPr>
           <a:xfrm>
-            <a:off x="838200" y="1825625"/>
-            <a:ext cx="10515600" cy="1698971"/>
-          </a:xfrm>
-        </p:spPr>
-        <p:txBody>
-          <a:bodyPr/>
-          <a:lstStyle/>
-          <a:p>
-            <a:r>
-              <a:rPr lang="fr-FR" dirty="0" smtClean="0"/>
-              <a:t>Passer par docker pour l’application et les bases de données</a:t>
-            </a:r>
-          </a:p>
-          <a:p>
-            <a:r>
-              <a:rPr lang="fr-FR" dirty="0" smtClean="0"/>
-              <a:t>Utiliser </a:t>
-            </a:r>
-            <a:r>
-              <a:rPr lang="fr-FR" dirty="0" err="1" smtClean="0"/>
-              <a:t>jenkins</a:t>
-            </a:r>
-            <a:r>
-              <a:rPr lang="fr-FR" dirty="0" smtClean="0"/>
-              <a:t> pour le déploiement</a:t>
-            </a:r>
-          </a:p>
-          <a:p>
-            <a:r>
-              <a:rPr lang="fr-FR" dirty="0" smtClean="0"/>
-              <a:t>Tout automatiser via des scripts </a:t>
-            </a:r>
-            <a:r>
-              <a:rPr lang="fr-FR" dirty="0" err="1" smtClean="0"/>
-              <a:t>shells</a:t>
-            </a:r>
-            <a:endParaRPr lang="fr-FR" dirty="0" smtClean="0"/>
-          </a:p>
-          <a:p>
-            <a:endParaRPr lang="fr-FR" dirty="0"/>
-          </a:p>
-        </p:txBody>
-      </p:sp>
-      <p:pic>
-        <p:nvPicPr>
-          <p:cNvPr id="5" name="Picture 2" descr="JoliCode - Naviguer sur votre infrastructure avec Docker"/>
-          <p:cNvPicPr>
-            <a:picLocks noChangeAspect="1" noChangeArrowheads="1"/>
-          </p:cNvPicPr>
-          <p:nvPr/>
-        </p:nvPicPr>
-        <p:blipFill>
-          <a:blip r:embed="rId2">
-            <a:extLst>
-              <a:ext uri="{28A0092B-C50C-407E-A947-70E740481C1C}">
-                <a14:useLocalDpi xmlns:a14="http://schemas.microsoft.com/office/drawing/2010/main" val="0"/>
-              </a:ext>
-            </a:extLst>
-          </a:blip>
-          <a:srcRect/>
-          <a:stretch>
-            <a:fillRect/>
-          </a:stretch>
-        </p:blipFill>
-        <p:spPr bwMode="auto">
-          <a:xfrm>
-            <a:off x="9487015" y="4561436"/>
-            <a:ext cx="2704985" cy="2238375"/>
+            <a:off x="1528463" y="1763849"/>
+            <a:ext cx="1903558" cy="1436124"/>
           </a:xfrm>
           <a:prstGeom prst="rect">
             <a:avLst/>
           </a:prstGeom>
-          <a:noFill/>
-          <a:extLst>
-            <a:ext uri="{909E8E84-426E-40DD-AFC4-6F175D3DCCD1}">
-              <a14:hiddenFill xmlns:a14="http://schemas.microsoft.com/office/drawing/2010/main">
+          <a:solidFill>
+            <a:schemeClr val="accent1">
+              <a:lumMod val="60000"/>
+              <a:lumOff val="40000"/>
+            </a:schemeClr>
+          </a:solidFill>
+          <a:ln w="28575">
+            <a:solidFill>
+              <a:schemeClr val="tx1"/>
+            </a:solidFill>
+          </a:ln>
+        </p:spPr>
+        <p:style>
+          <a:lnRef idx="2">
+            <a:schemeClr val="accent1">
+              <a:shade val="50000"/>
+            </a:schemeClr>
+          </a:lnRef>
+          <a:fillRef idx="1">
+            <a:schemeClr val="accent1"/>
+          </a:fillRef>
+          <a:effectRef idx="0">
+            <a:schemeClr val="accent1"/>
+          </a:effectRef>
+          <a:fontRef idx="minor">
+            <a:schemeClr val="lt1"/>
+          </a:fontRef>
+        </p:style>
+        <p:txBody>
+          <a:bodyPr rtlCol="0" anchor="ctr"/>
+          <a:lstStyle/>
+          <a:p>
+            <a:pPr algn="ctr"/>
+            <a:r>
+              <a:rPr lang="fr-FR" dirty="0" smtClean="0">
                 <a:solidFill>
-                  <a:srgbClr val="FFFFFF"/>
+                  <a:schemeClr val="tx1"/>
                 </a:solidFill>
-              </a14:hiddenFill>
-            </a:ext>
-          </a:extLst>
-        </p:spPr>
-      </p:pic>
-      <p:sp>
-        <p:nvSpPr>
-          <p:cNvPr id="6" name="ZoneTexte 5"/>
-          <p:cNvSpPr txBox="1"/>
+              </a:rPr>
+              <a:t>Front </a:t>
+            </a:r>
+            <a:r>
+              <a:rPr lang="fr-FR" dirty="0" err="1" smtClean="0">
+                <a:solidFill>
+                  <a:schemeClr val="tx1"/>
+                </a:solidFill>
+              </a:rPr>
+              <a:t>Angular</a:t>
+            </a:r>
+            <a:endParaRPr lang="fr-FR" dirty="0">
+              <a:solidFill>
+                <a:schemeClr val="tx1"/>
+              </a:solidFill>
+            </a:endParaRPr>
+          </a:p>
+        </p:txBody>
+      </p:sp>
+      <p:sp>
+        <p:nvSpPr>
+          <p:cNvPr id="5" name="Rectangle 4"/>
+          <p:cNvSpPr/>
           <p:nvPr/>
         </p:nvSpPr>
         <p:spPr>
           <a:xfrm>
-            <a:off x="955964" y="5777345"/>
-            <a:ext cx="8245399" cy="646331"/>
+            <a:off x="5140489" y="1764000"/>
+            <a:ext cx="1903558" cy="1436124"/>
           </a:xfrm>
           <a:prstGeom prst="rect">
             <a:avLst/>
           </a:prstGeom>
-          <a:noFill/>
+          <a:solidFill>
+            <a:schemeClr val="accent1">
+              <a:lumMod val="60000"/>
+              <a:lumOff val="40000"/>
+            </a:schemeClr>
+          </a:solidFill>
+          <a:ln w="28575">
+            <a:solidFill>
+              <a:schemeClr val="tx1"/>
+            </a:solidFill>
+          </a:ln>
         </p:spPr>
-        <p:txBody>
-          <a:bodyPr wrap="none" rtlCol="0">
-            <a:spAutoFit/>
-          </a:bodyPr>
-          <a:lstStyle/>
-          <a:p>
-            <a:r>
-              <a:rPr lang="fr-FR" b="1" dirty="0" smtClean="0">
+        <p:style>
+          <a:lnRef idx="2">
+            <a:schemeClr val="accent1">
+              <a:shade val="50000"/>
+            </a:schemeClr>
+          </a:lnRef>
+          <a:fillRef idx="1">
+            <a:schemeClr val="accent1"/>
+          </a:fillRef>
+          <a:effectRef idx="0">
+            <a:schemeClr val="accent1"/>
+          </a:effectRef>
+          <a:fontRef idx="minor">
+            <a:schemeClr val="lt1"/>
+          </a:fontRef>
+        </p:style>
+        <p:txBody>
+          <a:bodyPr rtlCol="0" anchor="ctr"/>
+          <a:lstStyle/>
+          <a:p>
+            <a:pPr algn="ctr"/>
+            <a:r>
+              <a:rPr lang="fr-FR" dirty="0">
                 <a:solidFill>
-                  <a:schemeClr val="accent6">
-                    <a:lumMod val="75000"/>
-                  </a:schemeClr>
+                  <a:schemeClr val="tx1"/>
                 </a:solidFill>
               </a:rPr>
-              <a:t>+ : 1 seule machine</a:t>
-            </a:r>
-          </a:p>
-          <a:p>
-            <a:r>
-              <a:rPr lang="fr-FR" b="1" dirty="0" smtClean="0">
+              <a:t>Back</a:t>
+            </a:r>
+          </a:p>
+          <a:p>
+            <a:pPr algn="ctr"/>
+            <a:r>
+              <a:rPr lang="fr-FR" dirty="0" err="1">
                 <a:solidFill>
-                  <a:srgbClr val="C00000"/>
+                  <a:schemeClr val="tx1"/>
                 </a:solidFill>
               </a:rPr>
-              <a:t>- : besoin d’une machine très puissante, scripts </a:t>
-            </a:r>
-            <a:r>
-              <a:rPr lang="fr-FR" b="1" dirty="0" err="1" smtClean="0">
+              <a:t>Apirest</a:t>
+            </a:r>
+            <a:endParaRPr lang="fr-FR" dirty="0">
+              <a:solidFill>
+                <a:schemeClr val="tx1"/>
+              </a:solidFill>
+            </a:endParaRPr>
+          </a:p>
+          <a:p>
+            <a:pPr algn="ctr"/>
+            <a:r>
+              <a:rPr lang="fr-FR" dirty="0" err="1">
                 <a:solidFill>
-                  <a:srgbClr val="C00000"/>
+                  <a:schemeClr val="tx1"/>
                 </a:solidFill>
               </a:rPr>
-              <a:t>shells</a:t>
-            </a:r>
-            <a:r>
-              <a:rPr lang="fr-FR" b="1" dirty="0" smtClean="0">
+              <a:t>JavaSpringboot</a:t>
+            </a:r>
+            <a:endParaRPr lang="fr-FR" dirty="0">
+              <a:solidFill>
+                <a:schemeClr val="tx1"/>
+              </a:solidFill>
+            </a:endParaRPr>
+          </a:p>
+        </p:txBody>
+      </p:sp>
+      <p:sp>
+        <p:nvSpPr>
+          <p:cNvPr id="6" name="Organigramme : Disque magnétique 5"/>
+          <p:cNvSpPr/>
+          <p:nvPr/>
+        </p:nvSpPr>
+        <p:spPr>
+          <a:xfrm>
+            <a:off x="8786554" y="1764000"/>
+            <a:ext cx="1421138" cy="1584000"/>
+          </a:xfrm>
+          <a:prstGeom prst="flowChartMagneticDisk">
+            <a:avLst/>
+          </a:prstGeom>
+          <a:solidFill>
+            <a:schemeClr val="accent1">
+              <a:lumMod val="60000"/>
+              <a:lumOff val="40000"/>
+            </a:schemeClr>
+          </a:solidFill>
+          <a:ln w="28575">
+            <a:solidFill>
+              <a:schemeClr val="tx1"/>
+            </a:solidFill>
+          </a:ln>
+        </p:spPr>
+        <p:style>
+          <a:lnRef idx="2">
+            <a:schemeClr val="accent1">
+              <a:shade val="50000"/>
+            </a:schemeClr>
+          </a:lnRef>
+          <a:fillRef idx="1">
+            <a:schemeClr val="accent1"/>
+          </a:fillRef>
+          <a:effectRef idx="0">
+            <a:schemeClr val="accent1"/>
+          </a:effectRef>
+          <a:fontRef idx="minor">
+            <a:schemeClr val="lt1"/>
+          </a:fontRef>
+        </p:style>
+        <p:txBody>
+          <a:bodyPr rtlCol="0" anchor="ctr"/>
+          <a:lstStyle/>
+          <a:p>
+            <a:pPr algn="ctr"/>
+            <a:r>
+              <a:rPr lang="fr-FR" dirty="0">
                 <a:solidFill>
-                  <a:srgbClr val="C00000"/>
+                  <a:schemeClr val="tx1"/>
                 </a:solidFill>
               </a:rPr>
-              <a:t> pas la meilleure automatisation</a:t>
-            </a:r>
-            <a:endParaRPr lang="fr-FR" b="1" dirty="0">
+              <a:t>SQL</a:t>
+            </a:r>
+          </a:p>
+        </p:txBody>
+      </p:sp>
+      <p:sp>
+        <p:nvSpPr>
+          <p:cNvPr id="7" name="Rectangle 6"/>
+          <p:cNvSpPr/>
+          <p:nvPr/>
+        </p:nvSpPr>
+        <p:spPr>
+          <a:xfrm>
+            <a:off x="5131724" y="4500000"/>
+            <a:ext cx="1903558" cy="1436124"/>
+          </a:xfrm>
+          <a:prstGeom prst="rect">
+            <a:avLst/>
+          </a:prstGeom>
+          <a:solidFill>
+            <a:schemeClr val="accent1">
+              <a:lumMod val="60000"/>
+              <a:lumOff val="40000"/>
+            </a:schemeClr>
+          </a:solidFill>
+          <a:ln w="28575">
+            <a:solidFill>
+              <a:schemeClr val="tx1"/>
+            </a:solidFill>
+          </a:ln>
+        </p:spPr>
+        <p:style>
+          <a:lnRef idx="2">
+            <a:schemeClr val="accent1">
+              <a:shade val="50000"/>
+            </a:schemeClr>
+          </a:lnRef>
+          <a:fillRef idx="1">
+            <a:schemeClr val="accent1"/>
+          </a:fillRef>
+          <a:effectRef idx="0">
+            <a:schemeClr val="accent1"/>
+          </a:effectRef>
+          <a:fontRef idx="minor">
+            <a:schemeClr val="lt1"/>
+          </a:fontRef>
+        </p:style>
+        <p:txBody>
+          <a:bodyPr rtlCol="0" anchor="ctr"/>
+          <a:lstStyle/>
+          <a:p>
+            <a:pPr algn="ctr"/>
+            <a:r>
+              <a:rPr lang="fr-FR" dirty="0" err="1">
+                <a:solidFill>
+                  <a:schemeClr val="tx1"/>
+                </a:solidFill>
+              </a:rPr>
+              <a:t>Apirest</a:t>
+            </a:r>
+            <a:endParaRPr lang="fr-FR" dirty="0">
               <a:solidFill>
-                <a:srgbClr val="C00000"/>
+                <a:schemeClr val="tx1"/>
               </a:solidFill>
             </a:endParaRPr>
           </a:p>
-        </p:txBody>
-      </p:sp>
+          <a:p>
+            <a:pPr algn="ctr"/>
+            <a:r>
+              <a:rPr lang="fr-FR" dirty="0">
+                <a:solidFill>
+                  <a:schemeClr val="tx1"/>
+                </a:solidFill>
+              </a:rPr>
+              <a:t>Java JEE</a:t>
+            </a:r>
+          </a:p>
+        </p:txBody>
+      </p:sp>
+      <p:cxnSp>
+        <p:nvCxnSpPr>
+          <p:cNvPr id="8" name="Connecteur droit avec flèche 7"/>
+          <p:cNvCxnSpPr/>
+          <p:nvPr/>
+        </p:nvCxnSpPr>
+        <p:spPr>
+          <a:xfrm flipV="1">
+            <a:off x="6092268" y="3508310"/>
+            <a:ext cx="0" cy="802432"/>
+          </a:xfrm>
+          <a:prstGeom prst="straightConnector1">
+            <a:avLst/>
+          </a:prstGeom>
+          <a:ln w="28575">
+            <a:solidFill>
+              <a:schemeClr val="tx1"/>
+            </a:solidFill>
+            <a:tailEnd type="triangle"/>
+          </a:ln>
+        </p:spPr>
+        <p:style>
+          <a:lnRef idx="1">
+            <a:schemeClr val="accent1"/>
+          </a:lnRef>
+          <a:fillRef idx="0">
+            <a:schemeClr val="accent1"/>
+          </a:fillRef>
+          <a:effectRef idx="0">
+            <a:schemeClr val="accent1"/>
+          </a:effectRef>
+          <a:fontRef idx="minor">
+            <a:schemeClr val="tx1"/>
+          </a:fontRef>
+        </p:style>
+      </p:cxnSp>
+      <p:sp>
+        <p:nvSpPr>
+          <p:cNvPr id="9" name="Organigramme : Disque magnétique 8"/>
+          <p:cNvSpPr/>
+          <p:nvPr/>
+        </p:nvSpPr>
+        <p:spPr>
+          <a:xfrm>
+            <a:off x="8786553" y="4500000"/>
+            <a:ext cx="1421138" cy="1623159"/>
+          </a:xfrm>
+          <a:prstGeom prst="flowChartMagneticDisk">
+            <a:avLst/>
+          </a:prstGeom>
+          <a:solidFill>
+            <a:schemeClr val="accent1">
+              <a:lumMod val="60000"/>
+              <a:lumOff val="40000"/>
+            </a:schemeClr>
+          </a:solidFill>
+          <a:ln w="28575">
+            <a:solidFill>
+              <a:schemeClr val="tx1"/>
+            </a:solidFill>
+          </a:ln>
+        </p:spPr>
+        <p:style>
+          <a:lnRef idx="2">
+            <a:schemeClr val="accent1">
+              <a:shade val="50000"/>
+            </a:schemeClr>
+          </a:lnRef>
+          <a:fillRef idx="1">
+            <a:schemeClr val="accent1"/>
+          </a:fillRef>
+          <a:effectRef idx="0">
+            <a:schemeClr val="accent1"/>
+          </a:effectRef>
+          <a:fontRef idx="minor">
+            <a:schemeClr val="lt1"/>
+          </a:fontRef>
+        </p:style>
+        <p:txBody>
+          <a:bodyPr rtlCol="0" anchor="ctr"/>
+          <a:lstStyle/>
+          <a:p>
+            <a:pPr algn="ctr"/>
+            <a:r>
+              <a:rPr lang="fr-FR" dirty="0">
+                <a:solidFill>
+                  <a:schemeClr val="tx1"/>
+                </a:solidFill>
+              </a:rPr>
+              <a:t>SQL</a:t>
+            </a:r>
+          </a:p>
+        </p:txBody>
+      </p:sp>
+      <p:cxnSp>
+        <p:nvCxnSpPr>
+          <p:cNvPr id="10" name="Connecteur droit 9"/>
+          <p:cNvCxnSpPr/>
+          <p:nvPr/>
+        </p:nvCxnSpPr>
+        <p:spPr>
+          <a:xfrm>
+            <a:off x="7434180" y="2481911"/>
+            <a:ext cx="1030778" cy="0"/>
+          </a:xfrm>
+          <a:prstGeom prst="line">
+            <a:avLst/>
+          </a:prstGeom>
+          <a:ln w="28575">
+            <a:solidFill>
+              <a:schemeClr val="tx1"/>
+            </a:solidFill>
+          </a:ln>
+        </p:spPr>
+        <p:style>
+          <a:lnRef idx="1">
+            <a:schemeClr val="accent1"/>
+          </a:lnRef>
+          <a:fillRef idx="0">
+            <a:schemeClr val="accent1"/>
+          </a:fillRef>
+          <a:effectRef idx="0">
+            <a:schemeClr val="accent1"/>
+          </a:effectRef>
+          <a:fontRef idx="minor">
+            <a:schemeClr val="tx1"/>
+          </a:fontRef>
+        </p:style>
+      </p:cxnSp>
+      <p:cxnSp>
+        <p:nvCxnSpPr>
+          <p:cNvPr id="11" name="Connecteur droit 10"/>
+          <p:cNvCxnSpPr/>
+          <p:nvPr/>
+        </p:nvCxnSpPr>
+        <p:spPr>
+          <a:xfrm>
+            <a:off x="3830868" y="2481911"/>
+            <a:ext cx="1030778" cy="0"/>
+          </a:xfrm>
+          <a:prstGeom prst="line">
+            <a:avLst/>
+          </a:prstGeom>
+          <a:ln w="28575">
+            <a:solidFill>
+              <a:schemeClr val="tx1"/>
+            </a:solidFill>
+          </a:ln>
+        </p:spPr>
+        <p:style>
+          <a:lnRef idx="1">
+            <a:schemeClr val="accent1"/>
+          </a:lnRef>
+          <a:fillRef idx="0">
+            <a:schemeClr val="accent1"/>
+          </a:fillRef>
+          <a:effectRef idx="0">
+            <a:schemeClr val="accent1"/>
+          </a:effectRef>
+          <a:fontRef idx="minor">
+            <a:schemeClr val="tx1"/>
+          </a:fontRef>
+        </p:style>
+      </p:cxnSp>
+      <p:cxnSp>
+        <p:nvCxnSpPr>
+          <p:cNvPr id="12" name="Connecteur droit 11"/>
+          <p:cNvCxnSpPr/>
+          <p:nvPr/>
+        </p:nvCxnSpPr>
+        <p:spPr>
+          <a:xfrm>
+            <a:off x="7509164" y="5048597"/>
+            <a:ext cx="1030778" cy="0"/>
+          </a:xfrm>
+          <a:prstGeom prst="line">
+            <a:avLst/>
+          </a:prstGeom>
+          <a:ln w="28575">
+            <a:solidFill>
+              <a:schemeClr val="tx1"/>
+            </a:solidFill>
+          </a:ln>
+        </p:spPr>
+        <p:style>
+          <a:lnRef idx="1">
+            <a:schemeClr val="accent1"/>
+          </a:lnRef>
+          <a:fillRef idx="0">
+            <a:schemeClr val="accent1"/>
+          </a:fillRef>
+          <a:effectRef idx="0">
+            <a:schemeClr val="accent1"/>
+          </a:effectRef>
+          <a:fontRef idx="minor">
+            <a:schemeClr val="tx1"/>
+          </a:fontRef>
+        </p:style>
+      </p:cxnSp>
     </p:spTree>
     <p:extLst>
       <p:ext uri="{BB962C8B-B14F-4D97-AF65-F5344CB8AC3E}">
-        <p14:creationId xmlns:p14="http://schemas.microsoft.com/office/powerpoint/2010/main" val="2567960355"/>
+        <p14:creationId xmlns:p14="http://schemas.microsoft.com/office/powerpoint/2010/main" val="1308018872"/>
       </p:ext>
     </p:extLst>
   </p:cSld>
@@ -3443,6 +3937,262 @@
       </p:sp>
       <p:sp>
         <p:nvSpPr>
+          <p:cNvPr id="3" name="Espace réservé du contenu 2"/>
+          <p:cNvSpPr>
+            <a:spLocks noGrp="1"/>
+          </p:cNvSpPr>
+          <p:nvPr>
+            <p:ph idx="1"/>
+          </p:nvPr>
+        </p:nvSpPr>
+        <p:spPr>
+          <a:xfrm>
+            <a:off x="838200" y="1825625"/>
+            <a:ext cx="10515600" cy="1698971"/>
+          </a:xfrm>
+        </p:spPr>
+        <p:txBody>
+          <a:bodyPr/>
+          <a:lstStyle/>
+          <a:p>
+            <a:r>
+              <a:rPr lang="fr-FR" dirty="0" smtClean="0"/>
+              <a:t>Passer par docker pour l’application et les bases de données</a:t>
+            </a:r>
+          </a:p>
+          <a:p>
+            <a:r>
+              <a:rPr lang="fr-FR" dirty="0" smtClean="0"/>
+              <a:t>Utiliser </a:t>
+            </a:r>
+            <a:r>
+              <a:rPr lang="fr-FR" dirty="0" err="1" smtClean="0"/>
+              <a:t>jenkins</a:t>
+            </a:r>
+            <a:r>
+              <a:rPr lang="fr-FR" dirty="0" smtClean="0"/>
+              <a:t> pour le déploiement</a:t>
+            </a:r>
+          </a:p>
+          <a:p>
+            <a:r>
+              <a:rPr lang="fr-FR" dirty="0" smtClean="0"/>
+              <a:t>Tout automatiser via des scripts </a:t>
+            </a:r>
+            <a:r>
+              <a:rPr lang="fr-FR" dirty="0" err="1" smtClean="0"/>
+              <a:t>shells</a:t>
+            </a:r>
+            <a:endParaRPr lang="fr-FR" dirty="0" smtClean="0"/>
+          </a:p>
+          <a:p>
+            <a:endParaRPr lang="fr-FR" dirty="0"/>
+          </a:p>
+        </p:txBody>
+      </p:sp>
+      <p:pic>
+        <p:nvPicPr>
+          <p:cNvPr id="5" name="Picture 2" descr="JoliCode - Naviguer sur votre infrastructure avec Docker"/>
+          <p:cNvPicPr>
+            <a:picLocks noChangeAspect="1" noChangeArrowheads="1"/>
+          </p:cNvPicPr>
+          <p:nvPr/>
+        </p:nvPicPr>
+        <p:blipFill>
+          <a:blip r:embed="rId2">
+            <a:extLst>
+              <a:ext uri="{28A0092B-C50C-407E-A947-70E740481C1C}">
+                <a14:useLocalDpi xmlns:a14="http://schemas.microsoft.com/office/drawing/2010/main" val="0"/>
+              </a:ext>
+            </a:extLst>
+          </a:blip>
+          <a:srcRect/>
+          <a:stretch>
+            <a:fillRect/>
+          </a:stretch>
+        </p:blipFill>
+        <p:spPr bwMode="auto">
+          <a:xfrm>
+            <a:off x="9487015" y="4561436"/>
+            <a:ext cx="2704985" cy="2238375"/>
+          </a:xfrm>
+          <a:prstGeom prst="rect">
+            <a:avLst/>
+          </a:prstGeom>
+          <a:noFill/>
+          <a:extLst>
+            <a:ext uri="{909E8E84-426E-40DD-AFC4-6F175D3DCCD1}">
+              <a14:hiddenFill xmlns:a14="http://schemas.microsoft.com/office/drawing/2010/main">
+                <a:solidFill>
+                  <a:srgbClr val="FFFFFF"/>
+                </a:solidFill>
+              </a14:hiddenFill>
+            </a:ext>
+          </a:extLst>
+        </p:spPr>
+      </p:pic>
+      <p:sp>
+        <p:nvSpPr>
+          <p:cNvPr id="6" name="ZoneTexte 5"/>
+          <p:cNvSpPr txBox="1"/>
+          <p:nvPr/>
+        </p:nvSpPr>
+        <p:spPr>
+          <a:xfrm>
+            <a:off x="955964" y="5777345"/>
+            <a:ext cx="8245399" cy="646331"/>
+          </a:xfrm>
+          <a:prstGeom prst="rect">
+            <a:avLst/>
+          </a:prstGeom>
+          <a:noFill/>
+        </p:spPr>
+        <p:txBody>
+          <a:bodyPr wrap="none" rtlCol="0">
+            <a:spAutoFit/>
+          </a:bodyPr>
+          <a:lstStyle/>
+          <a:p>
+            <a:r>
+              <a:rPr lang="fr-FR" b="1" dirty="0" smtClean="0">
+                <a:solidFill>
+                  <a:schemeClr val="accent6">
+                    <a:lumMod val="75000"/>
+                  </a:schemeClr>
+                </a:solidFill>
+              </a:rPr>
+              <a:t>+ : 1 seule machine, simple d’installation et d’utilisation</a:t>
+            </a:r>
+          </a:p>
+          <a:p>
+            <a:r>
+              <a:rPr lang="fr-FR" b="1" dirty="0" smtClean="0">
+                <a:solidFill>
+                  <a:srgbClr val="C00000"/>
+                </a:solidFill>
+              </a:rPr>
+              <a:t>- : besoin d’une machine très puissante, scripts </a:t>
+            </a:r>
+            <a:r>
+              <a:rPr lang="fr-FR" b="1" dirty="0" err="1" smtClean="0">
+                <a:solidFill>
+                  <a:srgbClr val="C00000"/>
+                </a:solidFill>
+              </a:rPr>
+              <a:t>shells</a:t>
+            </a:r>
+            <a:r>
+              <a:rPr lang="fr-FR" b="1" dirty="0" smtClean="0">
+                <a:solidFill>
+                  <a:srgbClr val="C00000"/>
+                </a:solidFill>
+              </a:rPr>
+              <a:t> pas la meilleure automatisation</a:t>
+            </a:r>
+            <a:endParaRPr lang="fr-FR" b="1" dirty="0">
+              <a:solidFill>
+                <a:srgbClr val="C00000"/>
+              </a:solidFill>
+            </a:endParaRPr>
+          </a:p>
+        </p:txBody>
+      </p:sp>
+      <p:pic>
+        <p:nvPicPr>
+          <p:cNvPr id="8" name="Picture 4" descr="Jenkins (logiciel) — Wikipédia"/>
+          <p:cNvPicPr>
+            <a:picLocks noChangeAspect="1" noChangeArrowheads="1"/>
+          </p:cNvPicPr>
+          <p:nvPr/>
+        </p:nvPicPr>
+        <p:blipFill>
+          <a:blip r:embed="rId3" cstate="print">
+            <a:extLst>
+              <a:ext uri="{28A0092B-C50C-407E-A947-70E740481C1C}">
+                <a14:useLocalDpi xmlns:a14="http://schemas.microsoft.com/office/drawing/2010/main" val="0"/>
+              </a:ext>
+            </a:extLst>
+          </a:blip>
+          <a:srcRect/>
+          <a:stretch>
+            <a:fillRect/>
+          </a:stretch>
+        </p:blipFill>
+        <p:spPr bwMode="auto">
+          <a:xfrm>
+            <a:off x="10471323" y="133282"/>
+            <a:ext cx="1288472" cy="1779165"/>
+          </a:xfrm>
+          <a:prstGeom prst="rect">
+            <a:avLst/>
+          </a:prstGeom>
+          <a:noFill/>
+          <a:extLst>
+            <a:ext uri="{909E8E84-426E-40DD-AFC4-6F175D3DCCD1}">
+              <a14:hiddenFill xmlns:a14="http://schemas.microsoft.com/office/drawing/2010/main">
+                <a:solidFill>
+                  <a:srgbClr val="FFFFFF"/>
+                </a:solidFill>
+              </a14:hiddenFill>
+            </a:ext>
+          </a:extLst>
+        </p:spPr>
+      </p:pic>
+    </p:spTree>
+    <p:extLst>
+      <p:ext uri="{BB962C8B-B14F-4D97-AF65-F5344CB8AC3E}">
+        <p14:creationId xmlns:p14="http://schemas.microsoft.com/office/powerpoint/2010/main" val="2567960355"/>
+      </p:ext>
+    </p:extLst>
+  </p:cSld>
+  <p:clrMapOvr>
+    <a:masterClrMapping/>
+  </p:clrMapOvr>
+</p:sld>
+</file>
+
+<file path=ppt/slides/slide4.xml><?xml version="1.0" encoding="utf-8"?>
+<p:sld xmlns:a="http://schemas.openxmlformats.org/drawingml/2006/main" xmlns:r="http://schemas.openxmlformats.org/officeDocument/2006/relationships" xmlns:p="http://schemas.openxmlformats.org/presentationml/2006/main">
+  <p:cSld>
+    <p:spTree>
+      <p:nvGrpSpPr>
+        <p:cNvPr id="1" name=""/>
+        <p:cNvGrpSpPr/>
+        <p:nvPr/>
+      </p:nvGrpSpPr>
+      <p:grpSpPr>
+        <a:xfrm>
+          <a:off x="0" y="0"/>
+          <a:ext cx="0" cy="0"/>
+          <a:chOff x="0" y="0"/>
+          <a:chExt cx="0" cy="0"/>
+        </a:xfrm>
+      </p:grpSpPr>
+      <p:sp>
+        <p:nvSpPr>
+          <p:cNvPr id="2" name="Titre 1"/>
+          <p:cNvSpPr>
+            <a:spLocks noGrp="1"/>
+          </p:cNvSpPr>
+          <p:nvPr>
+            <p:ph type="title"/>
+          </p:nvPr>
+        </p:nvSpPr>
+        <p:spPr/>
+        <p:txBody>
+          <a:bodyPr/>
+          <a:lstStyle/>
+          <a:p>
+            <a:r>
+              <a:rPr lang="fr-FR" dirty="0" smtClean="0"/>
+              <a:t>Idée</a:t>
+            </a:r>
+            <a:endParaRPr lang="fr-FR" dirty="0"/>
+          </a:p>
+        </p:txBody>
+      </p:sp>
+      <p:sp>
+        <p:nvSpPr>
           <p:cNvPr id="4" name="Rectangle 3"/>
           <p:cNvSpPr/>
           <p:nvPr/>
@@ -3457,11 +4207,11 @@
           </a:prstGeom>
           <a:solidFill>
             <a:schemeClr val="accent1">
-              <a:lumMod val="40000"/>
-              <a:lumOff val="60000"/>
+              <a:lumMod val="20000"/>
+              <a:lumOff val="80000"/>
             </a:schemeClr>
           </a:solidFill>
-          <a:ln>
+          <a:ln w="19050">
             <a:solidFill>
               <a:schemeClr val="tx1"/>
             </a:solidFill>
@@ -3639,7 +4389,7 @@
                 <a:lumOff val="60000"/>
               </a:schemeClr>
             </a:solidFill>
-            <a:ln>
+            <a:ln w="19050">
               <a:solidFill>
                 <a:schemeClr val="tx1"/>
               </a:solidFill>
@@ -3806,7 +4556,7 @@
                 <a:lumOff val="60000"/>
               </a:schemeClr>
             </a:solidFill>
-            <a:ln>
+            <a:ln w="19050">
               <a:solidFill>
                 <a:schemeClr val="tx1"/>
               </a:solidFill>
@@ -4357,7 +5107,7 @@
                 <a:lumOff val="60000"/>
               </a:schemeClr>
             </a:solidFill>
-            <a:ln>
+            <a:ln w="19050">
               <a:solidFill>
                 <a:schemeClr val="tx1"/>
               </a:solidFill>
@@ -4616,7 +5366,7 @@
 </p:sld>
 </file>
 
-<file path=ppt/slides/slide4.xml><?xml version="1.0" encoding="utf-8"?>
+<file path=ppt/slides/slide5.xml><?xml version="1.0" encoding="utf-8"?>
 <p:sld xmlns:a="http://schemas.openxmlformats.org/drawingml/2006/main" xmlns:r="http://schemas.openxmlformats.org/officeDocument/2006/relationships" xmlns:p="http://schemas.openxmlformats.org/presentationml/2006/main">
   <p:cSld>
     <p:spTree>
@@ -4731,13 +5481,23 @@
               <a:rPr lang="fr-FR" dirty="0" smtClean="0">
                 <a:sym typeface="Wingdings" panose="05000000000000000000" pitchFamily="2" charset="2"/>
               </a:rPr>
-              <a:t> forme plus légère </a:t>
-            </a:r>
-            <a:r>
-              <a:rPr lang="fr-FR" smtClean="0">
+              <a:t> forme plus légère de virtualisation</a:t>
+            </a:r>
+          </a:p>
+          <a:p>
+            <a:r>
+              <a:rPr lang="fr-FR" dirty="0" smtClean="0">
                 <a:sym typeface="Wingdings" panose="05000000000000000000" pitchFamily="2" charset="2"/>
               </a:rPr>
-              <a:t>de virtualisation</a:t>
+              <a:t>Possible de faire communiquer des dockers entre eux</a:t>
+            </a:r>
+          </a:p>
+          <a:p>
+            <a:r>
+              <a:rPr lang="fr-FR" dirty="0" smtClean="0">
+                <a:sym typeface="Wingdings" panose="05000000000000000000" pitchFamily="2" charset="2"/>
+              </a:rPr>
+              <a:t>Utilise un système de volume pour sauvegarder les données</a:t>
             </a:r>
           </a:p>
           <a:p>
@@ -4749,6 +5509,2461 @@
     <p:extLst>
       <p:ext uri="{BB962C8B-B14F-4D97-AF65-F5344CB8AC3E}">
         <p14:creationId xmlns:p14="http://schemas.microsoft.com/office/powerpoint/2010/main" val="803131442"/>
+      </p:ext>
+    </p:extLst>
+  </p:cSld>
+  <p:clrMapOvr>
+    <a:masterClrMapping/>
+  </p:clrMapOvr>
+</p:sld>
+</file>
+
+<file path=ppt/slides/slide6.xml><?xml version="1.0" encoding="utf-8"?>
+<p:sld xmlns:a="http://schemas.openxmlformats.org/drawingml/2006/main" xmlns:r="http://schemas.openxmlformats.org/officeDocument/2006/relationships" xmlns:p="http://schemas.openxmlformats.org/presentationml/2006/main">
+  <p:cSld>
+    <p:spTree>
+      <p:nvGrpSpPr>
+        <p:cNvPr id="1" name=""/>
+        <p:cNvGrpSpPr/>
+        <p:nvPr/>
+      </p:nvGrpSpPr>
+      <p:grpSpPr>
+        <a:xfrm>
+          <a:off x="0" y="0"/>
+          <a:ext cx="0" cy="0"/>
+          <a:chOff x="0" y="0"/>
+          <a:chExt cx="0" cy="0"/>
+        </a:xfrm>
+      </p:grpSpPr>
+      <p:sp>
+        <p:nvSpPr>
+          <p:cNvPr id="5" name="Rectangle 4"/>
+          <p:cNvSpPr/>
+          <p:nvPr/>
+        </p:nvSpPr>
+        <p:spPr>
+          <a:xfrm>
+            <a:off x="3567404" y="365125"/>
+            <a:ext cx="5057192" cy="6223518"/>
+          </a:xfrm>
+          <a:prstGeom prst="rect">
+            <a:avLst/>
+          </a:prstGeom>
+          <a:blipFill dpi="0" rotWithShape="1">
+            <a:blip r:embed="rId2">
+              <a:alphaModFix amt="10000"/>
+            </a:blip>
+            <a:srcRect/>
+            <a:stretch>
+              <a:fillRect/>
+            </a:stretch>
+          </a:blipFill>
+          <a:ln>
+            <a:noFill/>
+          </a:ln>
+        </p:spPr>
+        <p:style>
+          <a:lnRef idx="2">
+            <a:schemeClr val="accent1">
+              <a:shade val="50000"/>
+            </a:schemeClr>
+          </a:lnRef>
+          <a:fillRef idx="1">
+            <a:schemeClr val="accent1"/>
+          </a:fillRef>
+          <a:effectRef idx="0">
+            <a:schemeClr val="accent1"/>
+          </a:effectRef>
+          <a:fontRef idx="minor">
+            <a:schemeClr val="lt1"/>
+          </a:fontRef>
+        </p:style>
+        <p:txBody>
+          <a:bodyPr rtlCol="0" anchor="ctr"/>
+          <a:lstStyle/>
+          <a:p>
+            <a:pPr algn="ctr"/>
+            <a:endParaRPr lang="fr-FR"/>
+          </a:p>
+        </p:txBody>
+      </p:sp>
+      <p:sp>
+        <p:nvSpPr>
+          <p:cNvPr id="2" name="Titre 1"/>
+          <p:cNvSpPr>
+            <a:spLocks noGrp="1"/>
+          </p:cNvSpPr>
+          <p:nvPr>
+            <p:ph type="title"/>
+          </p:nvPr>
+        </p:nvSpPr>
+        <p:spPr/>
+        <p:txBody>
+          <a:bodyPr/>
+          <a:lstStyle/>
+          <a:p>
+            <a:r>
+              <a:rPr lang="fr-FR" dirty="0" smtClean="0"/>
+              <a:t>Jenkins</a:t>
+            </a:r>
+            <a:endParaRPr lang="fr-FR" dirty="0"/>
+          </a:p>
+        </p:txBody>
+      </p:sp>
+      <p:sp>
+        <p:nvSpPr>
+          <p:cNvPr id="3" name="Espace réservé du contenu 2"/>
+          <p:cNvSpPr>
+            <a:spLocks noGrp="1"/>
+          </p:cNvSpPr>
+          <p:nvPr>
+            <p:ph idx="1"/>
+          </p:nvPr>
+        </p:nvSpPr>
+        <p:spPr/>
+        <p:txBody>
+          <a:bodyPr/>
+          <a:lstStyle/>
+          <a:p>
+            <a:r>
+              <a:rPr lang="fr-FR" dirty="0" smtClean="0"/>
+              <a:t>Serveur d’automatisation</a:t>
+            </a:r>
+          </a:p>
+          <a:p>
+            <a:r>
+              <a:rPr lang="fr-FR" dirty="0" smtClean="0">
+                <a:sym typeface="Wingdings" panose="05000000000000000000" pitchFamily="2" charset="2"/>
+              </a:rPr>
+              <a:t>Nombreuses possibilités</a:t>
+            </a:r>
+          </a:p>
+          <a:p>
+            <a:r>
+              <a:rPr lang="fr-FR" dirty="0" smtClean="0">
+                <a:sym typeface="Wingdings" panose="05000000000000000000" pitchFamily="2" charset="2"/>
+              </a:rPr>
+              <a:t>Permet de lancer des scripts d’intégration ou </a:t>
+            </a:r>
+            <a:r>
+              <a:rPr lang="fr-FR" dirty="0" err="1" smtClean="0">
+                <a:sym typeface="Wingdings" panose="05000000000000000000" pitchFamily="2" charset="2"/>
+              </a:rPr>
+              <a:t>déployement</a:t>
+            </a:r>
+            <a:endParaRPr lang="fr-FR" dirty="0">
+              <a:sym typeface="Wingdings" panose="05000000000000000000" pitchFamily="2" charset="2"/>
+            </a:endParaRPr>
+          </a:p>
+          <a:p>
+            <a:r>
+              <a:rPr lang="fr-FR" dirty="0" smtClean="0">
+                <a:sym typeface="Wingdings" panose="05000000000000000000" pitchFamily="2" charset="2"/>
+              </a:rPr>
+              <a:t>(existe aussi sous forme de docker)</a:t>
+            </a:r>
+          </a:p>
+          <a:p>
+            <a:endParaRPr lang="fr-FR" dirty="0"/>
+          </a:p>
+        </p:txBody>
+      </p:sp>
+    </p:spTree>
+    <p:extLst>
+      <p:ext uri="{BB962C8B-B14F-4D97-AF65-F5344CB8AC3E}">
+        <p14:creationId xmlns:p14="http://schemas.microsoft.com/office/powerpoint/2010/main" val="1319428609"/>
+      </p:ext>
+    </p:extLst>
+  </p:cSld>
+  <p:clrMapOvr>
+    <a:masterClrMapping/>
+  </p:clrMapOvr>
+</p:sld>
+</file>
+
+<file path=ppt/slides/slide7.xml><?xml version="1.0" encoding="utf-8"?>
+<p:sld xmlns:a="http://schemas.openxmlformats.org/drawingml/2006/main" xmlns:r="http://schemas.openxmlformats.org/officeDocument/2006/relationships" xmlns:p="http://schemas.openxmlformats.org/presentationml/2006/main">
+  <p:cSld>
+    <p:spTree>
+      <p:nvGrpSpPr>
+        <p:cNvPr id="1" name=""/>
+        <p:cNvGrpSpPr/>
+        <p:nvPr/>
+      </p:nvGrpSpPr>
+      <p:grpSpPr>
+        <a:xfrm>
+          <a:off x="0" y="0"/>
+          <a:ext cx="0" cy="0"/>
+          <a:chOff x="0" y="0"/>
+          <a:chExt cx="0" cy="0"/>
+        </a:xfrm>
+      </p:grpSpPr>
+      <p:sp>
+        <p:nvSpPr>
+          <p:cNvPr id="4" name="Rectangle 3"/>
+          <p:cNvSpPr/>
+          <p:nvPr/>
+        </p:nvSpPr>
+        <p:spPr>
+          <a:xfrm>
+            <a:off x="3514725" y="994890"/>
+            <a:ext cx="8207391" cy="5158260"/>
+          </a:xfrm>
+          <a:prstGeom prst="rect">
+            <a:avLst/>
+          </a:prstGeom>
+          <a:solidFill>
+            <a:schemeClr val="accent1">
+              <a:lumMod val="20000"/>
+              <a:lumOff val="80000"/>
+            </a:schemeClr>
+          </a:solidFill>
+          <a:ln w="19050">
+            <a:solidFill>
+              <a:schemeClr val="tx1"/>
+            </a:solidFill>
+          </a:ln>
+        </p:spPr>
+        <p:style>
+          <a:lnRef idx="2">
+            <a:schemeClr val="accent1">
+              <a:shade val="50000"/>
+            </a:schemeClr>
+          </a:lnRef>
+          <a:fillRef idx="1">
+            <a:schemeClr val="accent1"/>
+          </a:fillRef>
+          <a:effectRef idx="0">
+            <a:schemeClr val="accent1"/>
+          </a:effectRef>
+          <a:fontRef idx="minor">
+            <a:schemeClr val="lt1"/>
+          </a:fontRef>
+        </p:style>
+        <p:txBody>
+          <a:bodyPr rtlCol="0" anchor="ctr"/>
+          <a:lstStyle/>
+          <a:p>
+            <a:pPr algn="ctr"/>
+            <a:endParaRPr lang="fr-FR"/>
+          </a:p>
+        </p:txBody>
+      </p:sp>
+      <p:grpSp>
+        <p:nvGrpSpPr>
+          <p:cNvPr id="20" name="Groupe 19"/>
+          <p:cNvGrpSpPr/>
+          <p:nvPr/>
+        </p:nvGrpSpPr>
+        <p:grpSpPr>
+          <a:xfrm>
+            <a:off x="211348" y="1930220"/>
+            <a:ext cx="590550" cy="1326738"/>
+            <a:chOff x="640556" y="3441780"/>
+            <a:chExt cx="590550" cy="1326738"/>
+          </a:xfrm>
+        </p:grpSpPr>
+        <p:cxnSp>
+          <p:nvCxnSpPr>
+            <p:cNvPr id="6" name="Connecteur droit 5"/>
+            <p:cNvCxnSpPr/>
+            <p:nvPr/>
+          </p:nvCxnSpPr>
+          <p:spPr>
+            <a:xfrm flipH="1">
+              <a:off x="914400" y="3834687"/>
+              <a:ext cx="5444" cy="635060"/>
+            </a:xfrm>
+            <a:prstGeom prst="line">
+              <a:avLst/>
+            </a:prstGeom>
+            <a:ln w="12700">
+              <a:solidFill>
+                <a:schemeClr val="tx1"/>
+              </a:solidFill>
+            </a:ln>
+          </p:spPr>
+          <p:style>
+            <a:lnRef idx="1">
+              <a:schemeClr val="accent1"/>
+            </a:lnRef>
+            <a:fillRef idx="0">
+              <a:schemeClr val="accent1"/>
+            </a:fillRef>
+            <a:effectRef idx="0">
+              <a:schemeClr val="accent1"/>
+            </a:effectRef>
+            <a:fontRef idx="minor">
+              <a:schemeClr val="tx1"/>
+            </a:fontRef>
+          </p:style>
+        </p:cxnSp>
+        <p:cxnSp>
+          <p:nvCxnSpPr>
+            <p:cNvPr id="10" name="Connecteur droit 9"/>
+            <p:cNvCxnSpPr/>
+            <p:nvPr/>
+          </p:nvCxnSpPr>
+          <p:spPr>
+            <a:xfrm>
+              <a:off x="640556" y="4126265"/>
+              <a:ext cx="590550" cy="9525"/>
+            </a:xfrm>
+            <a:prstGeom prst="line">
+              <a:avLst/>
+            </a:prstGeom>
+            <a:ln w="12700">
+              <a:solidFill>
+                <a:schemeClr val="tx1"/>
+              </a:solidFill>
+            </a:ln>
+          </p:spPr>
+          <p:style>
+            <a:lnRef idx="1">
+              <a:schemeClr val="accent1"/>
+            </a:lnRef>
+            <a:fillRef idx="0">
+              <a:schemeClr val="accent1"/>
+            </a:fillRef>
+            <a:effectRef idx="0">
+              <a:schemeClr val="accent1"/>
+            </a:effectRef>
+            <a:fontRef idx="minor">
+              <a:schemeClr val="tx1"/>
+            </a:fontRef>
+          </p:style>
+        </p:cxnSp>
+        <p:cxnSp>
+          <p:nvCxnSpPr>
+            <p:cNvPr id="12" name="Connecteur droit 11"/>
+            <p:cNvCxnSpPr/>
+            <p:nvPr/>
+          </p:nvCxnSpPr>
+          <p:spPr>
+            <a:xfrm>
+              <a:off x="914400" y="4482768"/>
+              <a:ext cx="257175" cy="276225"/>
+            </a:xfrm>
+            <a:prstGeom prst="line">
+              <a:avLst/>
+            </a:prstGeom>
+            <a:ln w="12700">
+              <a:solidFill>
+                <a:schemeClr val="tx1"/>
+              </a:solidFill>
+            </a:ln>
+          </p:spPr>
+          <p:style>
+            <a:lnRef idx="1">
+              <a:schemeClr val="accent1"/>
+            </a:lnRef>
+            <a:fillRef idx="0">
+              <a:schemeClr val="accent1"/>
+            </a:fillRef>
+            <a:effectRef idx="0">
+              <a:schemeClr val="accent1"/>
+            </a:effectRef>
+            <a:fontRef idx="minor">
+              <a:schemeClr val="tx1"/>
+            </a:fontRef>
+          </p:style>
+        </p:cxnSp>
+        <p:cxnSp>
+          <p:nvCxnSpPr>
+            <p:cNvPr id="14" name="Connecteur droit 13"/>
+            <p:cNvCxnSpPr/>
+            <p:nvPr/>
+          </p:nvCxnSpPr>
+          <p:spPr>
+            <a:xfrm flipH="1">
+              <a:off x="685800" y="4482768"/>
+              <a:ext cx="228600" cy="285750"/>
+            </a:xfrm>
+            <a:prstGeom prst="line">
+              <a:avLst/>
+            </a:prstGeom>
+            <a:ln w="12700">
+              <a:solidFill>
+                <a:schemeClr val="tx1"/>
+              </a:solidFill>
+            </a:ln>
+          </p:spPr>
+          <p:style>
+            <a:lnRef idx="1">
+              <a:schemeClr val="accent1"/>
+            </a:lnRef>
+            <a:fillRef idx="0">
+              <a:schemeClr val="accent1"/>
+            </a:fillRef>
+            <a:effectRef idx="0">
+              <a:schemeClr val="accent1"/>
+            </a:effectRef>
+            <a:fontRef idx="minor">
+              <a:schemeClr val="tx1"/>
+            </a:fontRef>
+          </p:style>
+        </p:cxnSp>
+        <p:sp>
+          <p:nvSpPr>
+            <p:cNvPr id="17" name="Émoticône 16"/>
+            <p:cNvSpPr/>
+            <p:nvPr/>
+          </p:nvSpPr>
+          <p:spPr>
+            <a:xfrm>
+              <a:off x="698896" y="3441780"/>
+              <a:ext cx="445294" cy="392907"/>
+            </a:xfrm>
+            <a:prstGeom prst="smileyFace">
+              <a:avLst/>
+            </a:prstGeom>
+            <a:solidFill>
+              <a:schemeClr val="bg1"/>
+            </a:solidFill>
+            <a:ln>
+              <a:solidFill>
+                <a:schemeClr val="tx1"/>
+              </a:solidFill>
+            </a:ln>
+          </p:spPr>
+          <p:style>
+            <a:lnRef idx="2">
+              <a:schemeClr val="accent1">
+                <a:shade val="50000"/>
+              </a:schemeClr>
+            </a:lnRef>
+            <a:fillRef idx="1">
+              <a:schemeClr val="accent1"/>
+            </a:fillRef>
+            <a:effectRef idx="0">
+              <a:schemeClr val="accent1"/>
+            </a:effectRef>
+            <a:fontRef idx="minor">
+              <a:schemeClr val="lt1"/>
+            </a:fontRef>
+          </p:style>
+          <p:txBody>
+            <a:bodyPr rtlCol="0" anchor="ctr"/>
+            <a:lstStyle/>
+            <a:p>
+              <a:pPr algn="ctr"/>
+              <a:endParaRPr lang="fr-FR"/>
+            </a:p>
+          </p:txBody>
+        </p:sp>
+      </p:grpSp>
+      <p:sp>
+        <p:nvSpPr>
+          <p:cNvPr id="22" name="Parallélogramme 21"/>
+          <p:cNvSpPr/>
+          <p:nvPr/>
+        </p:nvSpPr>
+        <p:spPr>
+          <a:xfrm>
+            <a:off x="984250" y="2640657"/>
+            <a:ext cx="545970" cy="235893"/>
+          </a:xfrm>
+          <a:prstGeom prst="parallelogram">
+            <a:avLst>
+              <a:gd name="adj" fmla="val 59995"/>
+            </a:avLst>
+          </a:prstGeom>
+          <a:solidFill>
+            <a:schemeClr val="bg1">
+              <a:lumMod val="95000"/>
+            </a:schemeClr>
+          </a:solidFill>
+          <a:ln>
+            <a:solidFill>
+              <a:schemeClr val="bg2">
+                <a:lumMod val="25000"/>
+              </a:schemeClr>
+            </a:solidFill>
+          </a:ln>
+        </p:spPr>
+        <p:style>
+          <a:lnRef idx="2">
+            <a:schemeClr val="accent1">
+              <a:shade val="50000"/>
+            </a:schemeClr>
+          </a:lnRef>
+          <a:fillRef idx="1">
+            <a:schemeClr val="accent1"/>
+          </a:fillRef>
+          <a:effectRef idx="0">
+            <a:schemeClr val="accent1"/>
+          </a:effectRef>
+          <a:fontRef idx="minor">
+            <a:schemeClr val="lt1"/>
+          </a:fontRef>
+        </p:style>
+        <p:txBody>
+          <a:bodyPr rtlCol="0" anchor="ctr"/>
+          <a:lstStyle/>
+          <a:p>
+            <a:pPr algn="ctr"/>
+            <a:endParaRPr lang="fr-FR"/>
+          </a:p>
+        </p:txBody>
+      </p:sp>
+      <p:sp>
+        <p:nvSpPr>
+          <p:cNvPr id="23" name="Rectangle 22"/>
+          <p:cNvSpPr/>
+          <p:nvPr/>
+        </p:nvSpPr>
+        <p:spPr>
+          <a:xfrm>
+            <a:off x="1124144" y="2323127"/>
+            <a:ext cx="406075" cy="323132"/>
+          </a:xfrm>
+          <a:prstGeom prst="rect">
+            <a:avLst/>
+          </a:prstGeom>
+          <a:solidFill>
+            <a:schemeClr val="bg1">
+              <a:lumMod val="95000"/>
+            </a:schemeClr>
+          </a:solidFill>
+          <a:ln>
+            <a:solidFill>
+              <a:schemeClr val="bg2">
+                <a:lumMod val="25000"/>
+              </a:schemeClr>
+            </a:solidFill>
+          </a:ln>
+        </p:spPr>
+        <p:style>
+          <a:lnRef idx="2">
+            <a:schemeClr val="accent1">
+              <a:shade val="50000"/>
+            </a:schemeClr>
+          </a:lnRef>
+          <a:fillRef idx="1">
+            <a:schemeClr val="accent1"/>
+          </a:fillRef>
+          <a:effectRef idx="0">
+            <a:schemeClr val="accent1"/>
+          </a:effectRef>
+          <a:fontRef idx="minor">
+            <a:schemeClr val="lt1"/>
+          </a:fontRef>
+        </p:style>
+        <p:txBody>
+          <a:bodyPr rtlCol="0" anchor="ctr"/>
+          <a:lstStyle/>
+          <a:p>
+            <a:pPr algn="ctr"/>
+            <a:endParaRPr lang="fr-FR"/>
+          </a:p>
+        </p:txBody>
+      </p:sp>
+      <p:sp>
+        <p:nvSpPr>
+          <p:cNvPr id="24" name="Rectangle 23"/>
+          <p:cNvSpPr/>
+          <p:nvPr/>
+        </p:nvSpPr>
+        <p:spPr>
+          <a:xfrm>
+            <a:off x="1188243" y="2390300"/>
+            <a:ext cx="223838" cy="167163"/>
+          </a:xfrm>
+          <a:prstGeom prst="rect">
+            <a:avLst/>
+          </a:prstGeom>
+        </p:spPr>
+        <p:style>
+          <a:lnRef idx="2">
+            <a:schemeClr val="accent1">
+              <a:shade val="50000"/>
+            </a:schemeClr>
+          </a:lnRef>
+          <a:fillRef idx="1">
+            <a:schemeClr val="accent1"/>
+          </a:fillRef>
+          <a:effectRef idx="0">
+            <a:schemeClr val="accent1"/>
+          </a:effectRef>
+          <a:fontRef idx="minor">
+            <a:schemeClr val="lt1"/>
+          </a:fontRef>
+        </p:style>
+        <p:txBody>
+          <a:bodyPr rtlCol="0" anchor="ctr"/>
+          <a:lstStyle/>
+          <a:p>
+            <a:pPr algn="ctr"/>
+            <a:endParaRPr lang="fr-FR"/>
+          </a:p>
+        </p:txBody>
+      </p:sp>
+      <p:cxnSp>
+        <p:nvCxnSpPr>
+          <p:cNvPr id="26" name="Connecteur droit 25"/>
+          <p:cNvCxnSpPr/>
+          <p:nvPr/>
+        </p:nvCxnSpPr>
+        <p:spPr>
+          <a:xfrm>
+            <a:off x="1210864" y="2431254"/>
+            <a:ext cx="166559" cy="0"/>
+          </a:xfrm>
+          <a:prstGeom prst="line">
+            <a:avLst/>
+          </a:prstGeom>
+          <a:ln>
+            <a:solidFill>
+              <a:schemeClr val="tx1"/>
+            </a:solidFill>
+          </a:ln>
+        </p:spPr>
+        <p:style>
+          <a:lnRef idx="1">
+            <a:schemeClr val="accent1"/>
+          </a:lnRef>
+          <a:fillRef idx="0">
+            <a:schemeClr val="accent1"/>
+          </a:fillRef>
+          <a:effectRef idx="0">
+            <a:schemeClr val="accent1"/>
+          </a:effectRef>
+          <a:fontRef idx="minor">
+            <a:schemeClr val="tx1"/>
+          </a:fontRef>
+        </p:style>
+      </p:cxnSp>
+      <p:cxnSp>
+        <p:nvCxnSpPr>
+          <p:cNvPr id="27" name="Connecteur droit 26"/>
+          <p:cNvCxnSpPr/>
+          <p:nvPr/>
+        </p:nvCxnSpPr>
+        <p:spPr>
+          <a:xfrm flipV="1">
+            <a:off x="1220325" y="2469355"/>
+            <a:ext cx="73819" cy="0"/>
+          </a:xfrm>
+          <a:prstGeom prst="line">
+            <a:avLst/>
+          </a:prstGeom>
+          <a:ln>
+            <a:solidFill>
+              <a:schemeClr val="tx1"/>
+            </a:solidFill>
+          </a:ln>
+        </p:spPr>
+        <p:style>
+          <a:lnRef idx="1">
+            <a:schemeClr val="accent1"/>
+          </a:lnRef>
+          <a:fillRef idx="0">
+            <a:schemeClr val="accent1"/>
+          </a:fillRef>
+          <a:effectRef idx="0">
+            <a:schemeClr val="accent1"/>
+          </a:effectRef>
+          <a:fontRef idx="minor">
+            <a:schemeClr val="tx1"/>
+          </a:fontRef>
+        </p:style>
+      </p:cxnSp>
+      <p:cxnSp>
+        <p:nvCxnSpPr>
+          <p:cNvPr id="28" name="Connecteur droit 27"/>
+          <p:cNvCxnSpPr/>
+          <p:nvPr/>
+        </p:nvCxnSpPr>
+        <p:spPr>
+          <a:xfrm flipV="1">
+            <a:off x="1220325" y="2509836"/>
+            <a:ext cx="73819" cy="0"/>
+          </a:xfrm>
+          <a:prstGeom prst="line">
+            <a:avLst/>
+          </a:prstGeom>
+          <a:ln>
+            <a:solidFill>
+              <a:schemeClr val="tx1"/>
+            </a:solidFill>
+          </a:ln>
+        </p:spPr>
+        <p:style>
+          <a:lnRef idx="1">
+            <a:schemeClr val="accent1"/>
+          </a:lnRef>
+          <a:fillRef idx="0">
+            <a:schemeClr val="accent1"/>
+          </a:fillRef>
+          <a:effectRef idx="0">
+            <a:schemeClr val="accent1"/>
+          </a:effectRef>
+          <a:fontRef idx="minor">
+            <a:schemeClr val="tx1"/>
+          </a:fontRef>
+        </p:style>
+      </p:cxnSp>
+      <p:sp>
+        <p:nvSpPr>
+          <p:cNvPr id="33" name="ZoneTexte 32"/>
+          <p:cNvSpPr txBox="1"/>
+          <p:nvPr/>
+        </p:nvSpPr>
+        <p:spPr>
+          <a:xfrm>
+            <a:off x="-5822" y="1484753"/>
+            <a:ext cx="947311" cy="307777"/>
+          </a:xfrm>
+          <a:prstGeom prst="rect">
+            <a:avLst/>
+          </a:prstGeom>
+          <a:noFill/>
+        </p:spPr>
+        <p:txBody>
+          <a:bodyPr wrap="none" rtlCol="0">
+            <a:spAutoFit/>
+          </a:bodyPr>
+          <a:lstStyle/>
+          <a:p>
+            <a:r>
+              <a:rPr lang="fr-FR" sz="1400" dirty="0" smtClean="0"/>
+              <a:t>Utilisateur</a:t>
+            </a:r>
+            <a:endParaRPr lang="fr-FR" sz="1400" dirty="0"/>
+          </a:p>
+        </p:txBody>
+      </p:sp>
+      <p:sp>
+        <p:nvSpPr>
+          <p:cNvPr id="35" name="ZoneTexte 34"/>
+          <p:cNvSpPr txBox="1"/>
+          <p:nvPr/>
+        </p:nvSpPr>
+        <p:spPr>
+          <a:xfrm>
+            <a:off x="820487" y="2888663"/>
+            <a:ext cx="762068" cy="954107"/>
+          </a:xfrm>
+          <a:prstGeom prst="rect">
+            <a:avLst/>
+          </a:prstGeom>
+          <a:noFill/>
+        </p:spPr>
+        <p:txBody>
+          <a:bodyPr wrap="none" rtlCol="0">
+            <a:spAutoFit/>
+          </a:bodyPr>
+          <a:lstStyle/>
+          <a:p>
+            <a:r>
+              <a:rPr lang="fr-FR" sz="1400" dirty="0" smtClean="0"/>
+              <a:t>Chrome</a:t>
+            </a:r>
+          </a:p>
+          <a:p>
+            <a:r>
+              <a:rPr lang="fr-FR" sz="1400" dirty="0" smtClean="0"/>
+              <a:t>Firefox</a:t>
+            </a:r>
+          </a:p>
+          <a:p>
+            <a:r>
+              <a:rPr lang="fr-FR" sz="1400" dirty="0" smtClean="0"/>
+              <a:t>IE</a:t>
+            </a:r>
+          </a:p>
+          <a:p>
+            <a:r>
+              <a:rPr lang="fr-FR" sz="1400" dirty="0" smtClean="0"/>
+              <a:t>…</a:t>
+            </a:r>
+            <a:endParaRPr lang="fr-FR" sz="1400" dirty="0"/>
+          </a:p>
+        </p:txBody>
+      </p:sp>
+      <p:grpSp>
+        <p:nvGrpSpPr>
+          <p:cNvPr id="36" name="Groupe 35"/>
+          <p:cNvGrpSpPr/>
+          <p:nvPr/>
+        </p:nvGrpSpPr>
+        <p:grpSpPr>
+          <a:xfrm>
+            <a:off x="8445227" y="3805794"/>
+            <a:ext cx="1641763" cy="906087"/>
+            <a:chOff x="838200" y="5040717"/>
+            <a:chExt cx="1641763" cy="906087"/>
+          </a:xfrm>
+        </p:grpSpPr>
+        <p:sp>
+          <p:nvSpPr>
+            <p:cNvPr id="37" name="Rectangle 36"/>
+            <p:cNvSpPr/>
+            <p:nvPr/>
+          </p:nvSpPr>
+          <p:spPr>
+            <a:xfrm>
+              <a:off x="838200" y="5040717"/>
+              <a:ext cx="1221971" cy="906087"/>
+            </a:xfrm>
+            <a:prstGeom prst="rect">
+              <a:avLst/>
+            </a:prstGeom>
+            <a:solidFill>
+              <a:schemeClr val="accent4">
+                <a:lumMod val="40000"/>
+                <a:lumOff val="60000"/>
+              </a:schemeClr>
+            </a:solidFill>
+            <a:ln w="19050">
+              <a:solidFill>
+                <a:schemeClr val="tx1"/>
+              </a:solidFill>
+            </a:ln>
+          </p:spPr>
+          <p:style>
+            <a:lnRef idx="2">
+              <a:schemeClr val="accent1">
+                <a:shade val="50000"/>
+              </a:schemeClr>
+            </a:lnRef>
+            <a:fillRef idx="1">
+              <a:schemeClr val="accent1"/>
+            </a:fillRef>
+            <a:effectRef idx="0">
+              <a:schemeClr val="accent1"/>
+            </a:effectRef>
+            <a:fontRef idx="minor">
+              <a:schemeClr val="lt1"/>
+            </a:fontRef>
+          </p:style>
+          <p:txBody>
+            <a:bodyPr rtlCol="0" anchor="ctr"/>
+            <a:lstStyle/>
+            <a:p>
+              <a:pPr algn="ctr"/>
+              <a:endParaRPr lang="fr-FR"/>
+            </a:p>
+          </p:txBody>
+        </p:sp>
+        <p:sp>
+          <p:nvSpPr>
+            <p:cNvPr id="38" name="ZoneTexte 37"/>
+            <p:cNvSpPr txBox="1"/>
+            <p:nvPr/>
+          </p:nvSpPr>
+          <p:spPr>
+            <a:xfrm>
+              <a:off x="917170" y="5040717"/>
+              <a:ext cx="1562793" cy="369332"/>
+            </a:xfrm>
+            <a:prstGeom prst="rect">
+              <a:avLst/>
+            </a:prstGeom>
+            <a:noFill/>
+          </p:spPr>
+          <p:txBody>
+            <a:bodyPr wrap="square" rtlCol="0">
+              <a:spAutoFit/>
+            </a:bodyPr>
+            <a:lstStyle/>
+            <a:p>
+              <a:r>
+                <a:rPr lang="fr-FR" b="1" dirty="0" smtClean="0"/>
+                <a:t>Docker 3</a:t>
+              </a:r>
+              <a:endParaRPr lang="fr-FR" b="1" dirty="0"/>
+            </a:p>
+          </p:txBody>
+        </p:sp>
+        <p:sp>
+          <p:nvSpPr>
+            <p:cNvPr id="39" name="ZoneTexte 38"/>
+            <p:cNvSpPr txBox="1"/>
+            <p:nvPr/>
+          </p:nvSpPr>
+          <p:spPr>
+            <a:xfrm>
+              <a:off x="917170" y="5577472"/>
+              <a:ext cx="1562793" cy="369332"/>
+            </a:xfrm>
+            <a:prstGeom prst="rect">
+              <a:avLst/>
+            </a:prstGeom>
+            <a:noFill/>
+          </p:spPr>
+          <p:txBody>
+            <a:bodyPr wrap="square" rtlCol="0">
+              <a:spAutoFit/>
+            </a:bodyPr>
+            <a:lstStyle/>
+            <a:p>
+              <a:r>
+                <a:rPr lang="fr-FR" dirty="0" err="1" smtClean="0"/>
+                <a:t>DataBase</a:t>
+              </a:r>
+              <a:endParaRPr lang="fr-FR" dirty="0"/>
+            </a:p>
+          </p:txBody>
+        </p:sp>
+        <p:pic>
+          <p:nvPicPr>
+            <p:cNvPr id="40" name="Picture 2" descr="Comprendre Docker et les conteneurs | Le Data Scientist"/>
+            <p:cNvPicPr>
+              <a:picLocks noChangeAspect="1" noChangeArrowheads="1"/>
+            </p:cNvPicPr>
+            <p:nvPr/>
+          </p:nvPicPr>
+          <p:blipFill>
+            <a:blip r:embed="rId2" cstate="print">
+              <a:extLst>
+                <a:ext uri="{28A0092B-C50C-407E-A947-70E740481C1C}">
+                  <a14:useLocalDpi xmlns:a14="http://schemas.microsoft.com/office/drawing/2010/main" val="0"/>
+                </a:ext>
+              </a:extLst>
+            </a:blip>
+            <a:srcRect/>
+            <a:stretch>
+              <a:fillRect/>
+            </a:stretch>
+          </p:blipFill>
+          <p:spPr bwMode="auto">
+            <a:xfrm>
+              <a:off x="1254525" y="5353200"/>
+              <a:ext cx="392230" cy="281283"/>
+            </a:xfrm>
+            <a:prstGeom prst="rect">
+              <a:avLst/>
+            </a:prstGeom>
+            <a:noFill/>
+            <a:extLst>
+              <a:ext uri="{909E8E84-426E-40DD-AFC4-6F175D3DCCD1}">
+                <a14:hiddenFill xmlns:a14="http://schemas.microsoft.com/office/drawing/2010/main">
+                  <a:solidFill>
+                    <a:srgbClr val="FFFFFF"/>
+                  </a:solidFill>
+                </a14:hiddenFill>
+              </a:ext>
+            </a:extLst>
+          </p:spPr>
+        </p:pic>
+      </p:grpSp>
+      <p:grpSp>
+        <p:nvGrpSpPr>
+          <p:cNvPr id="41" name="Groupe 40"/>
+          <p:cNvGrpSpPr/>
+          <p:nvPr/>
+        </p:nvGrpSpPr>
+        <p:grpSpPr>
+          <a:xfrm>
+            <a:off x="6486937" y="3805794"/>
+            <a:ext cx="1864128" cy="906087"/>
+            <a:chOff x="5106787" y="5044874"/>
+            <a:chExt cx="1864128" cy="906087"/>
+          </a:xfrm>
+        </p:grpSpPr>
+        <p:sp>
+          <p:nvSpPr>
+            <p:cNvPr id="42" name="Rectangle 41"/>
+            <p:cNvSpPr/>
+            <p:nvPr/>
+          </p:nvSpPr>
+          <p:spPr>
+            <a:xfrm>
+              <a:off x="5106787" y="5044874"/>
+              <a:ext cx="1221971" cy="906087"/>
+            </a:xfrm>
+            <a:prstGeom prst="rect">
+              <a:avLst/>
+            </a:prstGeom>
+            <a:solidFill>
+              <a:schemeClr val="accent4">
+                <a:lumMod val="40000"/>
+                <a:lumOff val="60000"/>
+              </a:schemeClr>
+            </a:solidFill>
+            <a:ln w="19050">
+              <a:solidFill>
+                <a:schemeClr val="tx1"/>
+              </a:solidFill>
+            </a:ln>
+          </p:spPr>
+          <p:style>
+            <a:lnRef idx="2">
+              <a:schemeClr val="accent1">
+                <a:shade val="50000"/>
+              </a:schemeClr>
+            </a:lnRef>
+            <a:fillRef idx="1">
+              <a:schemeClr val="accent1"/>
+            </a:fillRef>
+            <a:effectRef idx="0">
+              <a:schemeClr val="accent1"/>
+            </a:effectRef>
+            <a:fontRef idx="minor">
+              <a:schemeClr val="lt1"/>
+            </a:fontRef>
+          </p:style>
+          <p:txBody>
+            <a:bodyPr rtlCol="0" anchor="ctr"/>
+            <a:lstStyle/>
+            <a:p>
+              <a:pPr algn="ctr"/>
+              <a:endParaRPr lang="fr-FR"/>
+            </a:p>
+          </p:txBody>
+        </p:sp>
+        <p:sp>
+          <p:nvSpPr>
+            <p:cNvPr id="43" name="ZoneTexte 42"/>
+            <p:cNvSpPr txBox="1"/>
+            <p:nvPr/>
+          </p:nvSpPr>
+          <p:spPr>
+            <a:xfrm>
+              <a:off x="5185757" y="5044874"/>
+              <a:ext cx="1562793" cy="369332"/>
+            </a:xfrm>
+            <a:prstGeom prst="rect">
+              <a:avLst/>
+            </a:prstGeom>
+            <a:noFill/>
+          </p:spPr>
+          <p:txBody>
+            <a:bodyPr wrap="square" rtlCol="0">
+              <a:spAutoFit/>
+            </a:bodyPr>
+            <a:lstStyle/>
+            <a:p>
+              <a:r>
+                <a:rPr lang="fr-FR" b="1" dirty="0" smtClean="0"/>
+                <a:t>Docker 2</a:t>
+              </a:r>
+              <a:endParaRPr lang="fr-FR" b="1" dirty="0"/>
+            </a:p>
+          </p:txBody>
+        </p:sp>
+        <p:sp>
+          <p:nvSpPr>
+            <p:cNvPr id="44" name="ZoneTexte 43"/>
+            <p:cNvSpPr txBox="1"/>
+            <p:nvPr/>
+          </p:nvSpPr>
+          <p:spPr>
+            <a:xfrm>
+              <a:off x="5408122" y="5554028"/>
+              <a:ext cx="1562793" cy="369332"/>
+            </a:xfrm>
+            <a:prstGeom prst="rect">
+              <a:avLst/>
+            </a:prstGeom>
+            <a:noFill/>
+          </p:spPr>
+          <p:txBody>
+            <a:bodyPr wrap="square" rtlCol="0">
+              <a:spAutoFit/>
+            </a:bodyPr>
+            <a:lstStyle/>
+            <a:p>
+              <a:r>
+                <a:rPr lang="fr-FR" dirty="0" err="1" smtClean="0"/>
+                <a:t>apt</a:t>
+              </a:r>
+              <a:endParaRPr lang="fr-FR" dirty="0"/>
+            </a:p>
+          </p:txBody>
+        </p:sp>
+        <p:pic>
+          <p:nvPicPr>
+            <p:cNvPr id="45" name="Picture 2" descr="Comprendre Docker et les conteneurs | Le Data Scientist"/>
+            <p:cNvPicPr>
+              <a:picLocks noChangeAspect="1" noChangeArrowheads="1"/>
+            </p:cNvPicPr>
+            <p:nvPr/>
+          </p:nvPicPr>
+          <p:blipFill>
+            <a:blip r:embed="rId2" cstate="print">
+              <a:extLst>
+                <a:ext uri="{28A0092B-C50C-407E-A947-70E740481C1C}">
+                  <a14:useLocalDpi xmlns:a14="http://schemas.microsoft.com/office/drawing/2010/main" val="0"/>
+                </a:ext>
+              </a:extLst>
+            </a:blip>
+            <a:srcRect/>
+            <a:stretch>
+              <a:fillRect/>
+            </a:stretch>
+          </p:blipFill>
+          <p:spPr bwMode="auto">
+            <a:xfrm>
+              <a:off x="5547285" y="5353200"/>
+              <a:ext cx="392230" cy="281283"/>
+            </a:xfrm>
+            <a:prstGeom prst="rect">
+              <a:avLst/>
+            </a:prstGeom>
+            <a:noFill/>
+            <a:extLst>
+              <a:ext uri="{909E8E84-426E-40DD-AFC4-6F175D3DCCD1}">
+                <a14:hiddenFill xmlns:a14="http://schemas.microsoft.com/office/drawing/2010/main">
+                  <a:solidFill>
+                    <a:srgbClr val="FFFFFF"/>
+                  </a:solidFill>
+                </a14:hiddenFill>
+              </a:ext>
+            </a:extLst>
+          </p:spPr>
+        </p:pic>
+      </p:grpSp>
+      <p:grpSp>
+        <p:nvGrpSpPr>
+          <p:cNvPr id="46" name="Groupe 45"/>
+          <p:cNvGrpSpPr/>
+          <p:nvPr/>
+        </p:nvGrpSpPr>
+        <p:grpSpPr>
+          <a:xfrm>
+            <a:off x="4594588" y="3801717"/>
+            <a:ext cx="1864128" cy="906087"/>
+            <a:chOff x="5106787" y="5044874"/>
+            <a:chExt cx="1864128" cy="906087"/>
+          </a:xfrm>
+        </p:grpSpPr>
+        <p:sp>
+          <p:nvSpPr>
+            <p:cNvPr id="47" name="Rectangle 46"/>
+            <p:cNvSpPr/>
+            <p:nvPr/>
+          </p:nvSpPr>
+          <p:spPr>
+            <a:xfrm>
+              <a:off x="5106787" y="5044874"/>
+              <a:ext cx="1221971" cy="906087"/>
+            </a:xfrm>
+            <a:prstGeom prst="rect">
+              <a:avLst/>
+            </a:prstGeom>
+            <a:solidFill>
+              <a:schemeClr val="accent4">
+                <a:lumMod val="40000"/>
+                <a:lumOff val="60000"/>
+              </a:schemeClr>
+            </a:solidFill>
+            <a:ln w="19050">
+              <a:solidFill>
+                <a:schemeClr val="tx1"/>
+              </a:solidFill>
+            </a:ln>
+          </p:spPr>
+          <p:style>
+            <a:lnRef idx="2">
+              <a:schemeClr val="accent1">
+                <a:shade val="50000"/>
+              </a:schemeClr>
+            </a:lnRef>
+            <a:fillRef idx="1">
+              <a:schemeClr val="accent1"/>
+            </a:fillRef>
+            <a:effectRef idx="0">
+              <a:schemeClr val="accent1"/>
+            </a:effectRef>
+            <a:fontRef idx="minor">
+              <a:schemeClr val="lt1"/>
+            </a:fontRef>
+          </p:style>
+          <p:txBody>
+            <a:bodyPr rtlCol="0" anchor="ctr"/>
+            <a:lstStyle/>
+            <a:p>
+              <a:pPr algn="ctr"/>
+              <a:endParaRPr lang="fr-FR"/>
+            </a:p>
+          </p:txBody>
+        </p:sp>
+        <p:sp>
+          <p:nvSpPr>
+            <p:cNvPr id="48" name="ZoneTexte 47"/>
+            <p:cNvSpPr txBox="1"/>
+            <p:nvPr/>
+          </p:nvSpPr>
+          <p:spPr>
+            <a:xfrm>
+              <a:off x="5185757" y="5044874"/>
+              <a:ext cx="1562793" cy="369332"/>
+            </a:xfrm>
+            <a:prstGeom prst="rect">
+              <a:avLst/>
+            </a:prstGeom>
+            <a:noFill/>
+          </p:spPr>
+          <p:txBody>
+            <a:bodyPr wrap="square" rtlCol="0">
+              <a:spAutoFit/>
+            </a:bodyPr>
+            <a:lstStyle/>
+            <a:p>
+              <a:r>
+                <a:rPr lang="fr-FR" b="1" dirty="0" smtClean="0"/>
+                <a:t>Docker 1</a:t>
+              </a:r>
+              <a:endParaRPr lang="fr-FR" b="1" dirty="0"/>
+            </a:p>
+          </p:txBody>
+        </p:sp>
+        <p:sp>
+          <p:nvSpPr>
+            <p:cNvPr id="49" name="ZoneTexte 48"/>
+            <p:cNvSpPr txBox="1"/>
+            <p:nvPr/>
+          </p:nvSpPr>
+          <p:spPr>
+            <a:xfrm>
+              <a:off x="5408122" y="5554028"/>
+              <a:ext cx="1562793" cy="369332"/>
+            </a:xfrm>
+            <a:prstGeom prst="rect">
+              <a:avLst/>
+            </a:prstGeom>
+            <a:noFill/>
+          </p:spPr>
+          <p:txBody>
+            <a:bodyPr wrap="square" rtlCol="0">
+              <a:spAutoFit/>
+            </a:bodyPr>
+            <a:lstStyle/>
+            <a:p>
+              <a:r>
+                <a:rPr lang="fr-FR" dirty="0" smtClean="0"/>
+                <a:t>front</a:t>
+              </a:r>
+              <a:endParaRPr lang="fr-FR" dirty="0"/>
+            </a:p>
+          </p:txBody>
+        </p:sp>
+        <p:pic>
+          <p:nvPicPr>
+            <p:cNvPr id="50" name="Picture 2" descr="Comprendre Docker et les conteneurs | Le Data Scientist"/>
+            <p:cNvPicPr>
+              <a:picLocks noChangeAspect="1" noChangeArrowheads="1"/>
+            </p:cNvPicPr>
+            <p:nvPr/>
+          </p:nvPicPr>
+          <p:blipFill>
+            <a:blip r:embed="rId2" cstate="print">
+              <a:extLst>
+                <a:ext uri="{28A0092B-C50C-407E-A947-70E740481C1C}">
+                  <a14:useLocalDpi xmlns:a14="http://schemas.microsoft.com/office/drawing/2010/main" val="0"/>
+                </a:ext>
+              </a:extLst>
+            </a:blip>
+            <a:srcRect/>
+            <a:stretch>
+              <a:fillRect/>
+            </a:stretch>
+          </p:blipFill>
+          <p:spPr bwMode="auto">
+            <a:xfrm>
+              <a:off x="5547285" y="5353200"/>
+              <a:ext cx="392230" cy="281283"/>
+            </a:xfrm>
+            <a:prstGeom prst="rect">
+              <a:avLst/>
+            </a:prstGeom>
+            <a:noFill/>
+            <a:extLst>
+              <a:ext uri="{909E8E84-426E-40DD-AFC4-6F175D3DCCD1}">
+                <a14:hiddenFill xmlns:a14="http://schemas.microsoft.com/office/drawing/2010/main">
+                  <a:solidFill>
+                    <a:srgbClr val="FFFFFF"/>
+                  </a:solidFill>
+                </a14:hiddenFill>
+              </a:ext>
+            </a:extLst>
+          </p:spPr>
+        </p:pic>
+      </p:grpSp>
+      <p:grpSp>
+        <p:nvGrpSpPr>
+          <p:cNvPr id="56" name="Groupe 55"/>
+          <p:cNvGrpSpPr/>
+          <p:nvPr/>
+        </p:nvGrpSpPr>
+        <p:grpSpPr>
+          <a:xfrm>
+            <a:off x="3293706" y="3895010"/>
+            <a:ext cx="466531" cy="478972"/>
+            <a:chOff x="2979240" y="3512457"/>
+            <a:chExt cx="1079406" cy="478972"/>
+          </a:xfrm>
+        </p:grpSpPr>
+        <p:sp>
+          <p:nvSpPr>
+            <p:cNvPr id="51" name="Rectangle 50"/>
+            <p:cNvSpPr/>
+            <p:nvPr/>
+          </p:nvSpPr>
+          <p:spPr>
+            <a:xfrm>
+              <a:off x="3062514" y="3512457"/>
+              <a:ext cx="986972" cy="478972"/>
+            </a:xfrm>
+            <a:prstGeom prst="rect">
+              <a:avLst/>
+            </a:prstGeom>
+            <a:solidFill>
+              <a:schemeClr val="bg1"/>
+            </a:solidFill>
+            <a:ln>
+              <a:noFill/>
+            </a:ln>
+          </p:spPr>
+          <p:style>
+            <a:lnRef idx="2">
+              <a:schemeClr val="accent1">
+                <a:shade val="50000"/>
+              </a:schemeClr>
+            </a:lnRef>
+            <a:fillRef idx="1">
+              <a:schemeClr val="accent1"/>
+            </a:fillRef>
+            <a:effectRef idx="0">
+              <a:schemeClr val="accent1"/>
+            </a:effectRef>
+            <a:fontRef idx="minor">
+              <a:schemeClr val="lt1"/>
+            </a:fontRef>
+          </p:style>
+          <p:txBody>
+            <a:bodyPr rtlCol="0" anchor="ctr"/>
+            <a:lstStyle/>
+            <a:p>
+              <a:pPr algn="ctr"/>
+              <a:endParaRPr lang="fr-FR"/>
+            </a:p>
+          </p:txBody>
+        </p:sp>
+        <p:cxnSp>
+          <p:nvCxnSpPr>
+            <p:cNvPr id="53" name="Connecteur droit 52"/>
+            <p:cNvCxnSpPr/>
+            <p:nvPr/>
+          </p:nvCxnSpPr>
+          <p:spPr>
+            <a:xfrm flipV="1">
+              <a:off x="2979240" y="3512457"/>
+              <a:ext cx="1070969" cy="4172"/>
+            </a:xfrm>
+            <a:prstGeom prst="line">
+              <a:avLst/>
+            </a:prstGeom>
+            <a:ln w="28575">
+              <a:solidFill>
+                <a:schemeClr val="tx1"/>
+              </a:solidFill>
+              <a:prstDash val="sysDash"/>
+            </a:ln>
+          </p:spPr>
+          <p:style>
+            <a:lnRef idx="1">
+              <a:schemeClr val="accent1"/>
+            </a:lnRef>
+            <a:fillRef idx="0">
+              <a:schemeClr val="accent1"/>
+            </a:fillRef>
+            <a:effectRef idx="0">
+              <a:schemeClr val="accent1"/>
+            </a:effectRef>
+            <a:fontRef idx="minor">
+              <a:schemeClr val="tx1"/>
+            </a:fontRef>
+          </p:style>
+        </p:cxnSp>
+        <p:cxnSp>
+          <p:nvCxnSpPr>
+            <p:cNvPr id="55" name="Connecteur droit 54"/>
+            <p:cNvCxnSpPr/>
+            <p:nvPr/>
+          </p:nvCxnSpPr>
+          <p:spPr>
+            <a:xfrm flipV="1">
+              <a:off x="2987677" y="3986383"/>
+              <a:ext cx="1070969" cy="4172"/>
+            </a:xfrm>
+            <a:prstGeom prst="line">
+              <a:avLst/>
+            </a:prstGeom>
+            <a:ln w="28575">
+              <a:solidFill>
+                <a:schemeClr val="tx1"/>
+              </a:solidFill>
+              <a:prstDash val="sysDash"/>
+            </a:ln>
+          </p:spPr>
+          <p:style>
+            <a:lnRef idx="1">
+              <a:schemeClr val="accent1"/>
+            </a:lnRef>
+            <a:fillRef idx="0">
+              <a:schemeClr val="accent1"/>
+            </a:fillRef>
+            <a:effectRef idx="0">
+              <a:schemeClr val="accent1"/>
+            </a:effectRef>
+            <a:fontRef idx="minor">
+              <a:schemeClr val="tx1"/>
+            </a:fontRef>
+          </p:style>
+        </p:cxnSp>
+      </p:grpSp>
+      <p:grpSp>
+        <p:nvGrpSpPr>
+          <p:cNvPr id="57" name="Groupe 56"/>
+          <p:cNvGrpSpPr/>
+          <p:nvPr/>
+        </p:nvGrpSpPr>
+        <p:grpSpPr>
+          <a:xfrm rot="5400000">
+            <a:off x="7212830" y="819539"/>
+            <a:ext cx="513183" cy="478972"/>
+            <a:chOff x="2979240" y="3512457"/>
+            <a:chExt cx="1079406" cy="478972"/>
+          </a:xfrm>
+        </p:grpSpPr>
+        <p:sp>
+          <p:nvSpPr>
+            <p:cNvPr id="58" name="Rectangle 57"/>
+            <p:cNvSpPr/>
+            <p:nvPr/>
+          </p:nvSpPr>
+          <p:spPr>
+            <a:xfrm>
+              <a:off x="3062514" y="3512457"/>
+              <a:ext cx="986972" cy="478972"/>
+            </a:xfrm>
+            <a:prstGeom prst="rect">
+              <a:avLst/>
+            </a:prstGeom>
+            <a:solidFill>
+              <a:schemeClr val="bg1"/>
+            </a:solidFill>
+            <a:ln>
+              <a:noFill/>
+            </a:ln>
+          </p:spPr>
+          <p:style>
+            <a:lnRef idx="2">
+              <a:schemeClr val="accent1">
+                <a:shade val="50000"/>
+              </a:schemeClr>
+            </a:lnRef>
+            <a:fillRef idx="1">
+              <a:schemeClr val="accent1"/>
+            </a:fillRef>
+            <a:effectRef idx="0">
+              <a:schemeClr val="accent1"/>
+            </a:effectRef>
+            <a:fontRef idx="minor">
+              <a:schemeClr val="lt1"/>
+            </a:fontRef>
+          </p:style>
+          <p:txBody>
+            <a:bodyPr rtlCol="0" anchor="ctr"/>
+            <a:lstStyle/>
+            <a:p>
+              <a:pPr algn="ctr"/>
+              <a:endParaRPr lang="fr-FR"/>
+            </a:p>
+          </p:txBody>
+        </p:sp>
+        <p:cxnSp>
+          <p:nvCxnSpPr>
+            <p:cNvPr id="59" name="Connecteur droit 58"/>
+            <p:cNvCxnSpPr/>
+            <p:nvPr/>
+          </p:nvCxnSpPr>
+          <p:spPr>
+            <a:xfrm flipV="1">
+              <a:off x="2979240" y="3512457"/>
+              <a:ext cx="1070969" cy="4172"/>
+            </a:xfrm>
+            <a:prstGeom prst="line">
+              <a:avLst/>
+            </a:prstGeom>
+            <a:ln w="28575">
+              <a:solidFill>
+                <a:schemeClr val="tx1"/>
+              </a:solidFill>
+              <a:prstDash val="sysDash"/>
+            </a:ln>
+          </p:spPr>
+          <p:style>
+            <a:lnRef idx="1">
+              <a:schemeClr val="accent1"/>
+            </a:lnRef>
+            <a:fillRef idx="0">
+              <a:schemeClr val="accent1"/>
+            </a:fillRef>
+            <a:effectRef idx="0">
+              <a:schemeClr val="accent1"/>
+            </a:effectRef>
+            <a:fontRef idx="minor">
+              <a:schemeClr val="tx1"/>
+            </a:fontRef>
+          </p:style>
+        </p:cxnSp>
+        <p:cxnSp>
+          <p:nvCxnSpPr>
+            <p:cNvPr id="60" name="Connecteur droit 59"/>
+            <p:cNvCxnSpPr/>
+            <p:nvPr/>
+          </p:nvCxnSpPr>
+          <p:spPr>
+            <a:xfrm flipV="1">
+              <a:off x="2987677" y="3986383"/>
+              <a:ext cx="1070969" cy="4172"/>
+            </a:xfrm>
+            <a:prstGeom prst="line">
+              <a:avLst/>
+            </a:prstGeom>
+            <a:ln w="28575">
+              <a:solidFill>
+                <a:schemeClr val="tx1"/>
+              </a:solidFill>
+              <a:prstDash val="sysDash"/>
+            </a:ln>
+          </p:spPr>
+          <p:style>
+            <a:lnRef idx="1">
+              <a:schemeClr val="accent1"/>
+            </a:lnRef>
+            <a:fillRef idx="0">
+              <a:schemeClr val="accent1"/>
+            </a:fillRef>
+            <a:effectRef idx="0">
+              <a:schemeClr val="accent1"/>
+            </a:effectRef>
+            <a:fontRef idx="minor">
+              <a:schemeClr val="tx1"/>
+            </a:fontRef>
+          </p:style>
+        </p:cxnSp>
+      </p:grpSp>
+      <p:sp>
+        <p:nvSpPr>
+          <p:cNvPr id="61" name="ZoneTexte 60"/>
+          <p:cNvSpPr txBox="1"/>
+          <p:nvPr/>
+        </p:nvSpPr>
+        <p:spPr>
+          <a:xfrm>
+            <a:off x="7123550" y="6276810"/>
+            <a:ext cx="697627" cy="369332"/>
+          </a:xfrm>
+          <a:prstGeom prst="rect">
+            <a:avLst/>
+          </a:prstGeom>
+          <a:noFill/>
+        </p:spPr>
+        <p:txBody>
+          <a:bodyPr wrap="none" rtlCol="0">
+            <a:spAutoFit/>
+          </a:bodyPr>
+          <a:lstStyle/>
+          <a:p>
+            <a:r>
+              <a:rPr lang="fr-FR" dirty="0" smtClean="0"/>
+              <a:t>HOST</a:t>
+            </a:r>
+            <a:endParaRPr lang="fr-FR" dirty="0"/>
+          </a:p>
+        </p:txBody>
+      </p:sp>
+      <p:grpSp>
+        <p:nvGrpSpPr>
+          <p:cNvPr id="66" name="Groupe 65"/>
+          <p:cNvGrpSpPr/>
+          <p:nvPr/>
+        </p:nvGrpSpPr>
+        <p:grpSpPr>
+          <a:xfrm>
+            <a:off x="7616133" y="4133001"/>
+            <a:ext cx="882256" cy="274072"/>
+            <a:chOff x="2979240" y="3512457"/>
+            <a:chExt cx="1079406" cy="478972"/>
+          </a:xfrm>
+        </p:grpSpPr>
+        <p:sp>
+          <p:nvSpPr>
+            <p:cNvPr id="67" name="Rectangle 66"/>
+            <p:cNvSpPr/>
+            <p:nvPr/>
+          </p:nvSpPr>
+          <p:spPr>
+            <a:xfrm>
+              <a:off x="3062514" y="3512457"/>
+              <a:ext cx="986972" cy="478972"/>
+            </a:xfrm>
+            <a:prstGeom prst="rect">
+              <a:avLst/>
+            </a:prstGeom>
+            <a:solidFill>
+              <a:schemeClr val="accent4">
+                <a:lumMod val="40000"/>
+                <a:lumOff val="60000"/>
+              </a:schemeClr>
+            </a:solidFill>
+            <a:ln>
+              <a:noFill/>
+            </a:ln>
+          </p:spPr>
+          <p:style>
+            <a:lnRef idx="2">
+              <a:schemeClr val="accent1">
+                <a:shade val="50000"/>
+              </a:schemeClr>
+            </a:lnRef>
+            <a:fillRef idx="1">
+              <a:schemeClr val="accent1"/>
+            </a:fillRef>
+            <a:effectRef idx="0">
+              <a:schemeClr val="accent1"/>
+            </a:effectRef>
+            <a:fontRef idx="minor">
+              <a:schemeClr val="lt1"/>
+            </a:fontRef>
+          </p:style>
+          <p:txBody>
+            <a:bodyPr rtlCol="0" anchor="ctr"/>
+            <a:lstStyle/>
+            <a:p>
+              <a:pPr algn="ctr"/>
+              <a:endParaRPr lang="fr-FR"/>
+            </a:p>
+          </p:txBody>
+        </p:sp>
+        <p:cxnSp>
+          <p:nvCxnSpPr>
+            <p:cNvPr id="68" name="Connecteur droit 67"/>
+            <p:cNvCxnSpPr/>
+            <p:nvPr/>
+          </p:nvCxnSpPr>
+          <p:spPr>
+            <a:xfrm flipV="1">
+              <a:off x="2979240" y="3512457"/>
+              <a:ext cx="1070969" cy="4172"/>
+            </a:xfrm>
+            <a:prstGeom prst="line">
+              <a:avLst/>
+            </a:prstGeom>
+            <a:ln w="28575">
+              <a:solidFill>
+                <a:schemeClr val="tx1"/>
+              </a:solidFill>
+              <a:prstDash val="sysDash"/>
+            </a:ln>
+          </p:spPr>
+          <p:style>
+            <a:lnRef idx="1">
+              <a:schemeClr val="accent1"/>
+            </a:lnRef>
+            <a:fillRef idx="0">
+              <a:schemeClr val="accent1"/>
+            </a:fillRef>
+            <a:effectRef idx="0">
+              <a:schemeClr val="accent1"/>
+            </a:effectRef>
+            <a:fontRef idx="minor">
+              <a:schemeClr val="tx1"/>
+            </a:fontRef>
+          </p:style>
+        </p:cxnSp>
+        <p:cxnSp>
+          <p:nvCxnSpPr>
+            <p:cNvPr id="69" name="Connecteur droit 68"/>
+            <p:cNvCxnSpPr/>
+            <p:nvPr/>
+          </p:nvCxnSpPr>
+          <p:spPr>
+            <a:xfrm flipV="1">
+              <a:off x="2987677" y="3986383"/>
+              <a:ext cx="1070969" cy="4172"/>
+            </a:xfrm>
+            <a:prstGeom prst="line">
+              <a:avLst/>
+            </a:prstGeom>
+            <a:ln w="28575">
+              <a:solidFill>
+                <a:schemeClr val="tx1"/>
+              </a:solidFill>
+              <a:prstDash val="sysDash"/>
+            </a:ln>
+          </p:spPr>
+          <p:style>
+            <a:lnRef idx="1">
+              <a:schemeClr val="accent1"/>
+            </a:lnRef>
+            <a:fillRef idx="0">
+              <a:schemeClr val="accent1"/>
+            </a:fillRef>
+            <a:effectRef idx="0">
+              <a:schemeClr val="accent1"/>
+            </a:effectRef>
+            <a:fontRef idx="minor">
+              <a:schemeClr val="tx1"/>
+            </a:fontRef>
+          </p:style>
+        </p:cxnSp>
+      </p:grpSp>
+      <p:sp>
+        <p:nvSpPr>
+          <p:cNvPr id="71" name="ZoneTexte 70"/>
+          <p:cNvSpPr txBox="1"/>
+          <p:nvPr/>
+        </p:nvSpPr>
+        <p:spPr>
+          <a:xfrm>
+            <a:off x="1055369" y="1999938"/>
+            <a:ext cx="1011752" cy="307777"/>
+          </a:xfrm>
+          <a:prstGeom prst="rect">
+            <a:avLst/>
+          </a:prstGeom>
+          <a:noFill/>
+        </p:spPr>
+        <p:txBody>
+          <a:bodyPr wrap="none" rtlCol="0">
+            <a:spAutoFit/>
+          </a:bodyPr>
+          <a:lstStyle/>
+          <a:p>
+            <a:r>
+              <a:rPr lang="fr-FR" sz="1400" dirty="0" smtClean="0"/>
+              <a:t>Client riche</a:t>
+            </a:r>
+            <a:endParaRPr lang="fr-FR" sz="1400" dirty="0"/>
+          </a:p>
+        </p:txBody>
+      </p:sp>
+      <p:sp>
+        <p:nvSpPr>
+          <p:cNvPr id="89" name="ZoneTexte 88"/>
+          <p:cNvSpPr txBox="1"/>
+          <p:nvPr/>
+        </p:nvSpPr>
+        <p:spPr>
+          <a:xfrm>
+            <a:off x="7760944" y="3743346"/>
+            <a:ext cx="652743" cy="369332"/>
+          </a:xfrm>
+          <a:prstGeom prst="rect">
+            <a:avLst/>
+          </a:prstGeom>
+          <a:noFill/>
+        </p:spPr>
+        <p:txBody>
+          <a:bodyPr wrap="none" rtlCol="0">
+            <a:spAutoFit/>
+          </a:bodyPr>
+          <a:lstStyle/>
+          <a:p>
+            <a:r>
+              <a:rPr lang="fr-FR" b="1" dirty="0" smtClean="0">
+                <a:solidFill>
+                  <a:srgbClr val="7030A0"/>
+                </a:solidFill>
+              </a:rPr>
+              <a:t>3306</a:t>
+            </a:r>
+            <a:endParaRPr lang="fr-FR" b="1" dirty="0">
+              <a:solidFill>
+                <a:srgbClr val="7030A0"/>
+              </a:solidFill>
+            </a:endParaRPr>
+          </a:p>
+        </p:txBody>
+      </p:sp>
+      <p:sp>
+        <p:nvSpPr>
+          <p:cNvPr id="90" name="ZoneTexte 89"/>
+          <p:cNvSpPr txBox="1"/>
+          <p:nvPr/>
+        </p:nvSpPr>
+        <p:spPr>
+          <a:xfrm>
+            <a:off x="7802328" y="613015"/>
+            <a:ext cx="652743" cy="369332"/>
+          </a:xfrm>
+          <a:prstGeom prst="rect">
+            <a:avLst/>
+          </a:prstGeom>
+          <a:noFill/>
+        </p:spPr>
+        <p:txBody>
+          <a:bodyPr wrap="none" rtlCol="0">
+            <a:spAutoFit/>
+          </a:bodyPr>
+          <a:lstStyle/>
+          <a:p>
+            <a:r>
+              <a:rPr lang="fr-FR" b="1" dirty="0" smtClean="0">
+                <a:solidFill>
+                  <a:srgbClr val="7030A0"/>
+                </a:solidFill>
+              </a:rPr>
+              <a:t>8081</a:t>
+            </a:r>
+            <a:endParaRPr lang="fr-FR" b="1" dirty="0">
+              <a:solidFill>
+                <a:srgbClr val="7030A0"/>
+              </a:solidFill>
+            </a:endParaRPr>
+          </a:p>
+        </p:txBody>
+      </p:sp>
+      <p:grpSp>
+        <p:nvGrpSpPr>
+          <p:cNvPr id="91" name="Groupe 90"/>
+          <p:cNvGrpSpPr/>
+          <p:nvPr/>
+        </p:nvGrpSpPr>
+        <p:grpSpPr>
+          <a:xfrm rot="16200000">
+            <a:off x="6866226" y="3543802"/>
+            <a:ext cx="494347" cy="274072"/>
+            <a:chOff x="2979240" y="3512457"/>
+            <a:chExt cx="1079406" cy="478972"/>
+          </a:xfrm>
+        </p:grpSpPr>
+        <p:sp>
+          <p:nvSpPr>
+            <p:cNvPr id="92" name="Rectangle 91"/>
+            <p:cNvSpPr/>
+            <p:nvPr/>
+          </p:nvSpPr>
+          <p:spPr>
+            <a:xfrm>
+              <a:off x="3062514" y="3512457"/>
+              <a:ext cx="986972" cy="478972"/>
+            </a:xfrm>
+            <a:prstGeom prst="rect">
+              <a:avLst/>
+            </a:prstGeom>
+            <a:solidFill>
+              <a:schemeClr val="accent4">
+                <a:lumMod val="40000"/>
+                <a:lumOff val="60000"/>
+              </a:schemeClr>
+            </a:solidFill>
+            <a:ln>
+              <a:noFill/>
+            </a:ln>
+          </p:spPr>
+          <p:style>
+            <a:lnRef idx="2">
+              <a:schemeClr val="accent1">
+                <a:shade val="50000"/>
+              </a:schemeClr>
+            </a:lnRef>
+            <a:fillRef idx="1">
+              <a:schemeClr val="accent1"/>
+            </a:fillRef>
+            <a:effectRef idx="0">
+              <a:schemeClr val="accent1"/>
+            </a:effectRef>
+            <a:fontRef idx="minor">
+              <a:schemeClr val="lt1"/>
+            </a:fontRef>
+          </p:style>
+          <p:txBody>
+            <a:bodyPr rtlCol="0" anchor="ctr"/>
+            <a:lstStyle/>
+            <a:p>
+              <a:pPr algn="ctr"/>
+              <a:endParaRPr lang="fr-FR"/>
+            </a:p>
+          </p:txBody>
+        </p:sp>
+        <p:cxnSp>
+          <p:nvCxnSpPr>
+            <p:cNvPr id="93" name="Connecteur droit 92"/>
+            <p:cNvCxnSpPr/>
+            <p:nvPr/>
+          </p:nvCxnSpPr>
+          <p:spPr>
+            <a:xfrm flipV="1">
+              <a:off x="2979240" y="3512457"/>
+              <a:ext cx="1070969" cy="4172"/>
+            </a:xfrm>
+            <a:prstGeom prst="line">
+              <a:avLst/>
+            </a:prstGeom>
+            <a:ln w="28575">
+              <a:solidFill>
+                <a:schemeClr val="tx1"/>
+              </a:solidFill>
+              <a:prstDash val="sysDash"/>
+            </a:ln>
+          </p:spPr>
+          <p:style>
+            <a:lnRef idx="1">
+              <a:schemeClr val="accent1"/>
+            </a:lnRef>
+            <a:fillRef idx="0">
+              <a:schemeClr val="accent1"/>
+            </a:fillRef>
+            <a:effectRef idx="0">
+              <a:schemeClr val="accent1"/>
+            </a:effectRef>
+            <a:fontRef idx="minor">
+              <a:schemeClr val="tx1"/>
+            </a:fontRef>
+          </p:style>
+        </p:cxnSp>
+        <p:cxnSp>
+          <p:nvCxnSpPr>
+            <p:cNvPr id="94" name="Connecteur droit 93"/>
+            <p:cNvCxnSpPr/>
+            <p:nvPr/>
+          </p:nvCxnSpPr>
+          <p:spPr>
+            <a:xfrm flipV="1">
+              <a:off x="2987677" y="3986383"/>
+              <a:ext cx="1070969" cy="4172"/>
+            </a:xfrm>
+            <a:prstGeom prst="line">
+              <a:avLst/>
+            </a:prstGeom>
+            <a:ln w="28575">
+              <a:solidFill>
+                <a:schemeClr val="tx1"/>
+              </a:solidFill>
+              <a:prstDash val="sysDash"/>
+            </a:ln>
+          </p:spPr>
+          <p:style>
+            <a:lnRef idx="1">
+              <a:schemeClr val="accent1"/>
+            </a:lnRef>
+            <a:fillRef idx="0">
+              <a:schemeClr val="accent1"/>
+            </a:fillRef>
+            <a:effectRef idx="0">
+              <a:schemeClr val="accent1"/>
+            </a:effectRef>
+            <a:fontRef idx="minor">
+              <a:schemeClr val="tx1"/>
+            </a:fontRef>
+          </p:style>
+        </p:cxnSp>
+      </p:grpSp>
+      <p:grpSp>
+        <p:nvGrpSpPr>
+          <p:cNvPr id="82" name="Groupe 81"/>
+          <p:cNvGrpSpPr/>
+          <p:nvPr/>
+        </p:nvGrpSpPr>
+        <p:grpSpPr>
+          <a:xfrm>
+            <a:off x="1561245" y="116585"/>
+            <a:ext cx="5912575" cy="3496663"/>
+            <a:chOff x="1561245" y="116585"/>
+            <a:chExt cx="5991692" cy="3496663"/>
+          </a:xfrm>
+        </p:grpSpPr>
+        <p:sp>
+          <p:nvSpPr>
+            <p:cNvPr id="78" name="Forme libre 77"/>
+            <p:cNvSpPr/>
+            <p:nvPr/>
+          </p:nvSpPr>
+          <p:spPr>
+            <a:xfrm>
+              <a:off x="1561245" y="116585"/>
+              <a:ext cx="5991692" cy="3427796"/>
+            </a:xfrm>
+            <a:custGeom>
+              <a:avLst/>
+              <a:gdLst>
+                <a:gd name="connsiteX0" fmla="*/ 0 w 5991692"/>
+                <a:gd name="connsiteY0" fmla="*/ 2446721 h 3427796"/>
+                <a:gd name="connsiteX1" fmla="*/ 1285875 w 5991692"/>
+                <a:gd name="connsiteY1" fmla="*/ 2218121 h 3427796"/>
+                <a:gd name="connsiteX2" fmla="*/ 1495425 w 5991692"/>
+                <a:gd name="connsiteY2" fmla="*/ 398846 h 3427796"/>
+                <a:gd name="connsiteX3" fmla="*/ 5695950 w 5991692"/>
+                <a:gd name="connsiteY3" fmla="*/ 265496 h 3427796"/>
+                <a:gd name="connsiteX4" fmla="*/ 5648325 w 5991692"/>
+                <a:gd name="connsiteY4" fmla="*/ 3427796 h 3427796"/>
+              </a:gdLst>
+              <a:ahLst/>
+              <a:cxnLst>
+                <a:cxn ang="0">
+                  <a:pos x="connsiteX0" y="connsiteY0"/>
+                </a:cxn>
+                <a:cxn ang="0">
+                  <a:pos x="connsiteX1" y="connsiteY1"/>
+                </a:cxn>
+                <a:cxn ang="0">
+                  <a:pos x="connsiteX2" y="connsiteY2"/>
+                </a:cxn>
+                <a:cxn ang="0">
+                  <a:pos x="connsiteX3" y="connsiteY3"/>
+                </a:cxn>
+                <a:cxn ang="0">
+                  <a:pos x="connsiteX4" y="connsiteY4"/>
+                </a:cxn>
+              </a:cxnLst>
+              <a:rect l="l" t="t" r="r" b="b"/>
+              <a:pathLst>
+                <a:path w="5991692" h="3427796">
+                  <a:moveTo>
+                    <a:pt x="0" y="2446721"/>
+                  </a:moveTo>
+                  <a:cubicBezTo>
+                    <a:pt x="518318" y="2503077"/>
+                    <a:pt x="1036637" y="2559434"/>
+                    <a:pt x="1285875" y="2218121"/>
+                  </a:cubicBezTo>
+                  <a:cubicBezTo>
+                    <a:pt x="1535113" y="1876808"/>
+                    <a:pt x="760413" y="724283"/>
+                    <a:pt x="1495425" y="398846"/>
+                  </a:cubicBezTo>
+                  <a:cubicBezTo>
+                    <a:pt x="2230437" y="73409"/>
+                    <a:pt x="5003800" y="-239329"/>
+                    <a:pt x="5695950" y="265496"/>
+                  </a:cubicBezTo>
+                  <a:cubicBezTo>
+                    <a:pt x="6388100" y="770321"/>
+                    <a:pt x="5648325" y="2934084"/>
+                    <a:pt x="5648325" y="3427796"/>
+                  </a:cubicBezTo>
+                </a:path>
+              </a:pathLst>
+            </a:custGeom>
+            <a:noFill/>
+            <a:ln w="19050">
+              <a:solidFill>
+                <a:schemeClr val="tx1"/>
+              </a:solidFill>
+            </a:ln>
+          </p:spPr>
+          <p:style>
+            <a:lnRef idx="2">
+              <a:schemeClr val="accent1">
+                <a:shade val="50000"/>
+              </a:schemeClr>
+            </a:lnRef>
+            <a:fillRef idx="1">
+              <a:schemeClr val="accent1"/>
+            </a:fillRef>
+            <a:effectRef idx="0">
+              <a:schemeClr val="accent1"/>
+            </a:effectRef>
+            <a:fontRef idx="minor">
+              <a:schemeClr val="lt1"/>
+            </a:fontRef>
+          </p:style>
+          <p:txBody>
+            <a:bodyPr rtlCol="0" anchor="ctr"/>
+            <a:lstStyle/>
+            <a:p>
+              <a:pPr algn="ctr"/>
+              <a:endParaRPr lang="fr-FR"/>
+            </a:p>
+          </p:txBody>
+        </p:sp>
+        <p:cxnSp>
+          <p:nvCxnSpPr>
+            <p:cNvPr id="80" name="Connecteur droit avec flèche 79"/>
+            <p:cNvCxnSpPr>
+              <a:stCxn id="78" idx="4"/>
+            </p:cNvCxnSpPr>
+            <p:nvPr/>
+          </p:nvCxnSpPr>
+          <p:spPr>
+            <a:xfrm>
+              <a:off x="7209570" y="3544381"/>
+              <a:ext cx="1313" cy="68867"/>
+            </a:xfrm>
+            <a:prstGeom prst="straightConnector1">
+              <a:avLst/>
+            </a:prstGeom>
+            <a:ln w="19050">
+              <a:solidFill>
+                <a:schemeClr val="tx1"/>
+              </a:solidFill>
+              <a:tailEnd type="triangle"/>
+            </a:ln>
+          </p:spPr>
+          <p:style>
+            <a:lnRef idx="1">
+              <a:schemeClr val="accent1"/>
+            </a:lnRef>
+            <a:fillRef idx="0">
+              <a:schemeClr val="accent1"/>
+            </a:fillRef>
+            <a:effectRef idx="0">
+              <a:schemeClr val="accent1"/>
+            </a:effectRef>
+            <a:fontRef idx="minor">
+              <a:schemeClr val="tx1"/>
+            </a:fontRef>
+          </p:style>
+        </p:cxnSp>
+      </p:grpSp>
+      <p:sp>
+        <p:nvSpPr>
+          <p:cNvPr id="95" name="ZoneTexte 94"/>
+          <p:cNvSpPr txBox="1"/>
+          <p:nvPr/>
+        </p:nvSpPr>
+        <p:spPr>
+          <a:xfrm>
+            <a:off x="7253157" y="3389354"/>
+            <a:ext cx="652743" cy="369332"/>
+          </a:xfrm>
+          <a:prstGeom prst="rect">
+            <a:avLst/>
+          </a:prstGeom>
+          <a:noFill/>
+        </p:spPr>
+        <p:txBody>
+          <a:bodyPr wrap="none" rtlCol="0">
+            <a:spAutoFit/>
+          </a:bodyPr>
+          <a:lstStyle/>
+          <a:p>
+            <a:r>
+              <a:rPr lang="fr-FR" b="1" dirty="0" smtClean="0">
+                <a:solidFill>
+                  <a:srgbClr val="7030A0"/>
+                </a:solidFill>
+              </a:rPr>
+              <a:t>8080</a:t>
+            </a:r>
+            <a:endParaRPr lang="fr-FR" b="1" dirty="0">
+              <a:solidFill>
+                <a:srgbClr val="7030A0"/>
+              </a:solidFill>
+            </a:endParaRPr>
+          </a:p>
+        </p:txBody>
+      </p:sp>
+      <p:sp>
+        <p:nvSpPr>
+          <p:cNvPr id="96" name="ZoneTexte 95"/>
+          <p:cNvSpPr txBox="1"/>
+          <p:nvPr/>
+        </p:nvSpPr>
+        <p:spPr>
+          <a:xfrm>
+            <a:off x="2910398" y="3501190"/>
+            <a:ext cx="652743" cy="369332"/>
+          </a:xfrm>
+          <a:prstGeom prst="rect">
+            <a:avLst/>
+          </a:prstGeom>
+          <a:noFill/>
+        </p:spPr>
+        <p:txBody>
+          <a:bodyPr wrap="none" rtlCol="0">
+            <a:spAutoFit/>
+          </a:bodyPr>
+          <a:lstStyle/>
+          <a:p>
+            <a:r>
+              <a:rPr lang="fr-FR" b="1" dirty="0" smtClean="0">
+                <a:solidFill>
+                  <a:srgbClr val="7030A0"/>
+                </a:solidFill>
+              </a:rPr>
+              <a:t>8082</a:t>
+            </a:r>
+            <a:endParaRPr lang="fr-FR" b="1" dirty="0">
+              <a:solidFill>
+                <a:srgbClr val="7030A0"/>
+              </a:solidFill>
+            </a:endParaRPr>
+          </a:p>
+        </p:txBody>
+      </p:sp>
+      <p:grpSp>
+        <p:nvGrpSpPr>
+          <p:cNvPr id="101" name="Groupe 100"/>
+          <p:cNvGrpSpPr/>
+          <p:nvPr/>
+        </p:nvGrpSpPr>
+        <p:grpSpPr>
+          <a:xfrm>
+            <a:off x="1561245" y="2689635"/>
+            <a:ext cx="2861465" cy="1527802"/>
+            <a:chOff x="1561245" y="2689635"/>
+            <a:chExt cx="2861465" cy="1527802"/>
+          </a:xfrm>
+        </p:grpSpPr>
+        <p:sp>
+          <p:nvSpPr>
+            <p:cNvPr id="83" name="Forme libre 82"/>
+            <p:cNvSpPr/>
+            <p:nvPr/>
+          </p:nvSpPr>
+          <p:spPr>
+            <a:xfrm>
+              <a:off x="1614196" y="2733869"/>
+              <a:ext cx="2808514" cy="1483568"/>
+            </a:xfrm>
+            <a:custGeom>
+              <a:avLst/>
+              <a:gdLst>
+                <a:gd name="connsiteX0" fmla="*/ 0 w 2808514"/>
+                <a:gd name="connsiteY0" fmla="*/ 0 h 1483568"/>
+                <a:gd name="connsiteX1" fmla="*/ 821094 w 2808514"/>
+                <a:gd name="connsiteY1" fmla="*/ 1035698 h 1483568"/>
+                <a:gd name="connsiteX2" fmla="*/ 2808514 w 2808514"/>
+                <a:gd name="connsiteY2" fmla="*/ 1483568 h 1483568"/>
+              </a:gdLst>
+              <a:ahLst/>
+              <a:cxnLst>
+                <a:cxn ang="0">
+                  <a:pos x="connsiteX0" y="connsiteY0"/>
+                </a:cxn>
+                <a:cxn ang="0">
+                  <a:pos x="connsiteX1" y="connsiteY1"/>
+                </a:cxn>
+                <a:cxn ang="0">
+                  <a:pos x="connsiteX2" y="connsiteY2"/>
+                </a:cxn>
+              </a:cxnLst>
+              <a:rect l="l" t="t" r="r" b="b"/>
+              <a:pathLst>
+                <a:path w="2808514" h="1483568">
+                  <a:moveTo>
+                    <a:pt x="0" y="0"/>
+                  </a:moveTo>
+                  <a:cubicBezTo>
+                    <a:pt x="176504" y="394218"/>
+                    <a:pt x="353008" y="788437"/>
+                    <a:pt x="821094" y="1035698"/>
+                  </a:cubicBezTo>
+                  <a:cubicBezTo>
+                    <a:pt x="1289180" y="1282959"/>
+                    <a:pt x="2048847" y="1383263"/>
+                    <a:pt x="2808514" y="1483568"/>
+                  </a:cubicBezTo>
+                </a:path>
+              </a:pathLst>
+            </a:custGeom>
+            <a:noFill/>
+            <a:ln w="19050">
+              <a:solidFill>
+                <a:schemeClr val="tx1"/>
+              </a:solidFill>
+            </a:ln>
+          </p:spPr>
+          <p:style>
+            <a:lnRef idx="2">
+              <a:schemeClr val="accent1">
+                <a:shade val="50000"/>
+              </a:schemeClr>
+            </a:lnRef>
+            <a:fillRef idx="1">
+              <a:schemeClr val="accent1"/>
+            </a:fillRef>
+            <a:effectRef idx="0">
+              <a:schemeClr val="accent1"/>
+            </a:effectRef>
+            <a:fontRef idx="minor">
+              <a:schemeClr val="lt1"/>
+            </a:fontRef>
+          </p:style>
+          <p:txBody>
+            <a:bodyPr rtlCol="0" anchor="ctr"/>
+            <a:lstStyle/>
+            <a:p>
+              <a:pPr algn="ctr"/>
+              <a:endParaRPr lang="fr-FR"/>
+            </a:p>
+          </p:txBody>
+        </p:sp>
+        <p:cxnSp>
+          <p:nvCxnSpPr>
+            <p:cNvPr id="98" name="Connecteur droit avec flèche 97"/>
+            <p:cNvCxnSpPr/>
+            <p:nvPr/>
+          </p:nvCxnSpPr>
+          <p:spPr>
+            <a:xfrm flipH="1" flipV="1">
+              <a:off x="1561245" y="2689635"/>
+              <a:ext cx="55092" cy="51884"/>
+            </a:xfrm>
+            <a:prstGeom prst="straightConnector1">
+              <a:avLst/>
+            </a:prstGeom>
+            <a:ln w="19050">
+              <a:solidFill>
+                <a:schemeClr val="tx1"/>
+              </a:solidFill>
+              <a:tailEnd type="triangle"/>
+            </a:ln>
+          </p:spPr>
+          <p:style>
+            <a:lnRef idx="1">
+              <a:schemeClr val="accent1"/>
+            </a:lnRef>
+            <a:fillRef idx="0">
+              <a:schemeClr val="accent1"/>
+            </a:fillRef>
+            <a:effectRef idx="0">
+              <a:schemeClr val="accent1"/>
+            </a:effectRef>
+            <a:fontRef idx="minor">
+              <a:schemeClr val="tx1"/>
+            </a:fontRef>
+          </p:style>
+        </p:cxnSp>
+      </p:grpSp>
+    </p:spTree>
+    <p:extLst>
+      <p:ext uri="{BB962C8B-B14F-4D97-AF65-F5344CB8AC3E}">
+        <p14:creationId xmlns:p14="http://schemas.microsoft.com/office/powerpoint/2010/main" val="3765471993"/>
+      </p:ext>
+    </p:extLst>
+  </p:cSld>
+  <p:clrMapOvr>
+    <a:masterClrMapping/>
+  </p:clrMapOvr>
+</p:sld>
+</file>
+
+<file path=ppt/slides/slide8.xml><?xml version="1.0" encoding="utf-8"?>
+<p:sld xmlns:a="http://schemas.openxmlformats.org/drawingml/2006/main" xmlns:r="http://schemas.openxmlformats.org/officeDocument/2006/relationships" xmlns:p="http://schemas.openxmlformats.org/presentationml/2006/main">
+  <p:cSld>
+    <p:spTree>
+      <p:nvGrpSpPr>
+        <p:cNvPr id="1" name=""/>
+        <p:cNvGrpSpPr/>
+        <p:nvPr/>
+      </p:nvGrpSpPr>
+      <p:grpSpPr>
+        <a:xfrm>
+          <a:off x="0" y="0"/>
+          <a:ext cx="0" cy="0"/>
+          <a:chOff x="0" y="0"/>
+          <a:chExt cx="0" cy="0"/>
+        </a:xfrm>
+      </p:grpSpPr>
+      <p:sp>
+        <p:nvSpPr>
+          <p:cNvPr id="2" name="Titre 1"/>
+          <p:cNvSpPr>
+            <a:spLocks noGrp="1"/>
+          </p:cNvSpPr>
+          <p:nvPr>
+            <p:ph type="title"/>
+          </p:nvPr>
+        </p:nvSpPr>
+        <p:spPr/>
+        <p:txBody>
+          <a:bodyPr/>
+          <a:lstStyle/>
+          <a:p>
+            <a:endParaRPr lang="fr-FR"/>
+          </a:p>
+        </p:txBody>
+      </p:sp>
+      <p:sp>
+        <p:nvSpPr>
+          <p:cNvPr id="3" name="Espace réservé du contenu 2"/>
+          <p:cNvSpPr>
+            <a:spLocks noGrp="1"/>
+          </p:cNvSpPr>
+          <p:nvPr>
+            <p:ph idx="1"/>
+          </p:nvPr>
+        </p:nvSpPr>
+        <p:spPr/>
+        <p:txBody>
+          <a:bodyPr/>
+          <a:lstStyle/>
+          <a:p>
+            <a:endParaRPr lang="fr-FR"/>
+          </a:p>
+        </p:txBody>
+      </p:sp>
+    </p:spTree>
+    <p:extLst>
+      <p:ext uri="{BB962C8B-B14F-4D97-AF65-F5344CB8AC3E}">
+        <p14:creationId xmlns:p14="http://schemas.microsoft.com/office/powerpoint/2010/main" val="3845481858"/>
+      </p:ext>
+    </p:extLst>
+  </p:cSld>
+  <p:clrMapOvr>
+    <a:masterClrMapping/>
+  </p:clrMapOvr>
+</p:sld>
+</file>
+
+<file path=ppt/slides/slide9.xml><?xml version="1.0" encoding="utf-8"?>
+<p:sld xmlns:a="http://schemas.openxmlformats.org/drawingml/2006/main" xmlns:r="http://schemas.openxmlformats.org/officeDocument/2006/relationships" xmlns:p="http://schemas.openxmlformats.org/presentationml/2006/main">
+  <p:cSld>
+    <p:spTree>
+      <p:nvGrpSpPr>
+        <p:cNvPr id="1" name=""/>
+        <p:cNvGrpSpPr/>
+        <p:nvPr/>
+      </p:nvGrpSpPr>
+      <p:grpSpPr>
+        <a:xfrm>
+          <a:off x="0" y="0"/>
+          <a:ext cx="0" cy="0"/>
+          <a:chOff x="0" y="0"/>
+          <a:chExt cx="0" cy="0"/>
+        </a:xfrm>
+      </p:grpSpPr>
+      <p:sp>
+        <p:nvSpPr>
+          <p:cNvPr id="2" name="Titre 1"/>
+          <p:cNvSpPr>
+            <a:spLocks noGrp="1"/>
+          </p:cNvSpPr>
+          <p:nvPr>
+            <p:ph type="title"/>
+          </p:nvPr>
+        </p:nvSpPr>
+        <p:spPr/>
+        <p:txBody>
+          <a:bodyPr/>
+          <a:lstStyle/>
+          <a:p>
+            <a:endParaRPr lang="fr-FR"/>
+          </a:p>
+        </p:txBody>
+      </p:sp>
+      <p:sp>
+        <p:nvSpPr>
+          <p:cNvPr id="3" name="Espace réservé du contenu 2"/>
+          <p:cNvSpPr>
+            <a:spLocks noGrp="1"/>
+          </p:cNvSpPr>
+          <p:nvPr>
+            <p:ph idx="1"/>
+          </p:nvPr>
+        </p:nvSpPr>
+        <p:spPr/>
+        <p:txBody>
+          <a:bodyPr/>
+          <a:lstStyle/>
+          <a:p>
+            <a:endParaRPr lang="fr-FR"/>
+          </a:p>
+        </p:txBody>
+      </p:sp>
+    </p:spTree>
+    <p:extLst>
+      <p:ext uri="{BB962C8B-B14F-4D97-AF65-F5344CB8AC3E}">
+        <p14:creationId xmlns:p14="http://schemas.microsoft.com/office/powerpoint/2010/main" val="1576883657"/>
       </p:ext>
     </p:extLst>
   </p:cSld>

</xml_diff>